<commit_message>
major update to presentation
added extended model description slides
</commit_message>
<xml_diff>
--- a/bottleneck_pres.pptx
+++ b/bottleneck_pres.pptx
@@ -8,11 +8,21 @@
     <p:sldId id="256" r:id="rId2"/>
     <p:sldId id="260" r:id="rId3"/>
     <p:sldId id="261" r:id="rId4"/>
-    <p:sldId id="262" r:id="rId5"/>
-    <p:sldId id="263" r:id="rId6"/>
-    <p:sldId id="257" r:id="rId7"/>
-    <p:sldId id="258" r:id="rId8"/>
-    <p:sldId id="259" r:id="rId9"/>
+    <p:sldId id="269" r:id="rId5"/>
+    <p:sldId id="270" r:id="rId6"/>
+    <p:sldId id="262" r:id="rId7"/>
+    <p:sldId id="271" r:id="rId8"/>
+    <p:sldId id="272" r:id="rId9"/>
+    <p:sldId id="273" r:id="rId10"/>
+    <p:sldId id="263" r:id="rId11"/>
+    <p:sldId id="257" r:id="rId12"/>
+    <p:sldId id="264" r:id="rId13"/>
+    <p:sldId id="265" r:id="rId14"/>
+    <p:sldId id="267" r:id="rId15"/>
+    <p:sldId id="268" r:id="rId16"/>
+    <p:sldId id="266" r:id="rId17"/>
+    <p:sldId id="258" r:id="rId18"/>
+    <p:sldId id="259" r:id="rId19"/>
   </p:sldIdLst>
   <p:sldSz cx="9144000" cy="6858000" type="screen4x3"/>
   <p:notesSz cx="6858000" cy="9144000"/>
@@ -3165,6 +3175,1450 @@
 </p:sld>
 </file>
 
+<file path=ppt/slides/slide10.xml><?xml version="1.0" encoding="utf-8"?>
+<p:sld xmlns:a="http://schemas.openxmlformats.org/drawingml/2006/main" xmlns:r="http://schemas.openxmlformats.org/officeDocument/2006/relationships" xmlns:p="http://schemas.openxmlformats.org/presentationml/2006/main">
+  <p:cSld>
+    <p:spTree>
+      <p:nvGrpSpPr>
+        <p:cNvPr id="1" name=""/>
+        <p:cNvGrpSpPr/>
+        <p:nvPr/>
+      </p:nvGrpSpPr>
+      <p:grpSpPr>
+        <a:xfrm>
+          <a:off x="0" y="0"/>
+          <a:ext cx="0" cy="0"/>
+          <a:chOff x="0" y="0"/>
+          <a:chExt cx="0" cy="0"/>
+        </a:xfrm>
+      </p:grpSpPr>
+      <p:sp>
+        <p:nvSpPr>
+          <p:cNvPr id="2" name="Title 1"/>
+          <p:cNvSpPr>
+            <a:spLocks noGrp="1"/>
+          </p:cNvSpPr>
+          <p:nvPr>
+            <p:ph type="title"/>
+          </p:nvPr>
+        </p:nvSpPr>
+        <p:spPr/>
+        <p:txBody>
+          <a:bodyPr/>
+          <a:lstStyle/>
+          <a:p>
+            <a:r>
+              <a:rPr lang="en-US" dirty="0" smtClean="0"/>
+              <a:t>How do we use BM and OU?</a:t>
+            </a:r>
+            <a:endParaRPr lang="en-US" dirty="0"/>
+          </a:p>
+        </p:txBody>
+      </p:sp>
+      <p:sp>
+        <p:nvSpPr>
+          <p:cNvPr id="3" name="Content Placeholder 2"/>
+          <p:cNvSpPr>
+            <a:spLocks noGrp="1"/>
+          </p:cNvSpPr>
+          <p:nvPr>
+            <p:ph idx="1"/>
+          </p:nvPr>
+        </p:nvSpPr>
+        <p:spPr/>
+        <p:txBody>
+          <a:bodyPr/>
+          <a:lstStyle/>
+          <a:p>
+            <a:r>
+              <a:rPr lang="en-US" dirty="0" smtClean="0"/>
+              <a:t>To estimate</a:t>
+            </a:r>
+            <a:endParaRPr lang="en-US" dirty="0"/>
+          </a:p>
+        </p:txBody>
+      </p:sp>
+    </p:spTree>
+    <p:extLst>
+      <p:ext uri="{BB962C8B-B14F-4D97-AF65-F5344CB8AC3E}">
+        <p14:creationId xmlns:p14="http://schemas.microsoft.com/office/powerpoint/2010/main" val="955027292"/>
+      </p:ext>
+    </p:extLst>
+  </p:cSld>
+  <p:clrMapOvr>
+    <a:masterClrMapping/>
+  </p:clrMapOvr>
+</p:sld>
+</file>
+
+<file path=ppt/slides/slide11.xml><?xml version="1.0" encoding="utf-8"?>
+<p:sld xmlns:a="http://schemas.openxmlformats.org/drawingml/2006/main" xmlns:r="http://schemas.openxmlformats.org/officeDocument/2006/relationships" xmlns:p="http://schemas.openxmlformats.org/presentationml/2006/main">
+  <p:cSld>
+    <p:spTree>
+      <p:nvGrpSpPr>
+        <p:cNvPr id="1" name=""/>
+        <p:cNvGrpSpPr/>
+        <p:nvPr/>
+      </p:nvGrpSpPr>
+      <p:grpSpPr>
+        <a:xfrm>
+          <a:off x="0" y="0"/>
+          <a:ext cx="0" cy="0"/>
+          <a:chOff x="0" y="0"/>
+          <a:chExt cx="0" cy="0"/>
+        </a:xfrm>
+      </p:grpSpPr>
+      <p:sp>
+        <p:nvSpPr>
+          <p:cNvPr id="2" name="Title 1"/>
+          <p:cNvSpPr>
+            <a:spLocks noGrp="1"/>
+          </p:cNvSpPr>
+          <p:nvPr>
+            <p:ph type="title"/>
+          </p:nvPr>
+        </p:nvSpPr>
+        <p:spPr/>
+        <p:txBody>
+          <a:bodyPr>
+            <a:normAutofit/>
+          </a:bodyPr>
+          <a:lstStyle/>
+          <a:p>
+            <a:r>
+              <a:rPr lang="en-US" dirty="0" smtClean="0"/>
+              <a:t>Do bottlenecks affect the variance? </a:t>
+            </a:r>
+            <a:endParaRPr lang="en-US" dirty="0"/>
+          </a:p>
+        </p:txBody>
+      </p:sp>
+      <p:sp>
+        <p:nvSpPr>
+          <p:cNvPr id="3" name="Content Placeholder 2"/>
+          <p:cNvSpPr>
+            <a:spLocks noGrp="1"/>
+          </p:cNvSpPr>
+          <p:nvPr>
+            <p:ph idx="1"/>
+          </p:nvPr>
+        </p:nvSpPr>
+        <p:spPr>
+          <a:xfrm>
+            <a:off x="457200" y="5777983"/>
+            <a:ext cx="1510213" cy="715540"/>
+          </a:xfrm>
+        </p:spPr>
+        <p:txBody>
+          <a:bodyPr>
+            <a:noAutofit/>
+          </a:bodyPr>
+          <a:lstStyle/>
+          <a:p>
+            <a:pPr marL="0" indent="0">
+              <a:buNone/>
+            </a:pPr>
+            <a:r>
+              <a:rPr lang="en-US" sz="4000" dirty="0" smtClean="0"/>
+              <a:t>BM</a:t>
+            </a:r>
+            <a:endParaRPr lang="en-US" sz="4000" dirty="0"/>
+          </a:p>
+        </p:txBody>
+      </p:sp>
+    </p:spTree>
+    <p:extLst>
+      <p:ext uri="{BB962C8B-B14F-4D97-AF65-F5344CB8AC3E}">
+        <p14:creationId xmlns:p14="http://schemas.microsoft.com/office/powerpoint/2010/main" val="1396534205"/>
+      </p:ext>
+    </p:extLst>
+  </p:cSld>
+  <p:clrMapOvr>
+    <a:masterClrMapping/>
+  </p:clrMapOvr>
+</p:sld>
+</file>
+
+<file path=ppt/slides/slide12.xml><?xml version="1.0" encoding="utf-8"?>
+<p:sld xmlns:a="http://schemas.openxmlformats.org/drawingml/2006/main" xmlns:r="http://schemas.openxmlformats.org/officeDocument/2006/relationships" xmlns:p="http://schemas.openxmlformats.org/presentationml/2006/main">
+  <p:cSld>
+    <p:spTree>
+      <p:nvGrpSpPr>
+        <p:cNvPr id="1" name=""/>
+        <p:cNvGrpSpPr/>
+        <p:nvPr/>
+      </p:nvGrpSpPr>
+      <p:grpSpPr>
+        <a:xfrm>
+          <a:off x="0" y="0"/>
+          <a:ext cx="0" cy="0"/>
+          <a:chOff x="0" y="0"/>
+          <a:chExt cx="0" cy="0"/>
+        </a:xfrm>
+      </p:grpSpPr>
+      <p:sp>
+        <p:nvSpPr>
+          <p:cNvPr id="2" name="Title 1"/>
+          <p:cNvSpPr>
+            <a:spLocks noGrp="1"/>
+          </p:cNvSpPr>
+          <p:nvPr>
+            <p:ph type="title"/>
+          </p:nvPr>
+        </p:nvSpPr>
+        <p:spPr/>
+        <p:txBody>
+          <a:bodyPr>
+            <a:normAutofit/>
+          </a:bodyPr>
+          <a:lstStyle/>
+          <a:p>
+            <a:r>
+              <a:rPr lang="en-US" dirty="0" smtClean="0"/>
+              <a:t>Do bottlenecks affect the variance? </a:t>
+            </a:r>
+            <a:endParaRPr lang="en-US" dirty="0"/>
+          </a:p>
+        </p:txBody>
+      </p:sp>
+      <p:sp>
+        <p:nvSpPr>
+          <p:cNvPr id="4" name="Content Placeholder 2"/>
+          <p:cNvSpPr txBox="1">
+            <a:spLocks/>
+          </p:cNvSpPr>
+          <p:nvPr/>
+        </p:nvSpPr>
+        <p:spPr>
+          <a:xfrm>
+            <a:off x="457200" y="5777983"/>
+            <a:ext cx="1510213" cy="715540"/>
+          </a:xfrm>
+          <a:prstGeom prst="rect">
+            <a:avLst/>
+          </a:prstGeom>
+        </p:spPr>
+        <p:txBody>
+          <a:bodyPr vert="horz" lIns="91440" tIns="45720" rIns="91440" bIns="45720" rtlCol="0">
+            <a:noAutofit/>
+          </a:bodyPr>
+          <a:lstStyle>
+            <a:lvl1pPr marL="342900" indent="-342900" algn="l" defTabSz="457200" rtl="0" eaLnBrk="1" latinLnBrk="0" hangingPunct="1">
+              <a:spcBef>
+                <a:spcPct val="20000"/>
+              </a:spcBef>
+              <a:buFont typeface="Arial"/>
+              <a:buChar char="•"/>
+              <a:defRPr sz="3200" kern="1200">
+                <a:solidFill>
+                  <a:schemeClr val="tx1"/>
+                </a:solidFill>
+                <a:latin typeface="+mn-lt"/>
+                <a:ea typeface="+mn-ea"/>
+                <a:cs typeface="+mn-cs"/>
+              </a:defRPr>
+            </a:lvl1pPr>
+            <a:lvl2pPr marL="742950" indent="-285750" algn="l" defTabSz="457200" rtl="0" eaLnBrk="1" latinLnBrk="0" hangingPunct="1">
+              <a:spcBef>
+                <a:spcPct val="20000"/>
+              </a:spcBef>
+              <a:buFont typeface="Arial"/>
+              <a:buChar char="–"/>
+              <a:defRPr sz="2800" kern="1200">
+                <a:solidFill>
+                  <a:schemeClr val="tx1"/>
+                </a:solidFill>
+                <a:latin typeface="+mn-lt"/>
+                <a:ea typeface="+mn-ea"/>
+                <a:cs typeface="+mn-cs"/>
+              </a:defRPr>
+            </a:lvl2pPr>
+            <a:lvl3pPr marL="1143000" indent="-228600" algn="l" defTabSz="457200" rtl="0" eaLnBrk="1" latinLnBrk="0" hangingPunct="1">
+              <a:spcBef>
+                <a:spcPct val="20000"/>
+              </a:spcBef>
+              <a:buFont typeface="Arial"/>
+              <a:buChar char="•"/>
+              <a:defRPr sz="2400" kern="1200">
+                <a:solidFill>
+                  <a:schemeClr val="tx1"/>
+                </a:solidFill>
+                <a:latin typeface="+mn-lt"/>
+                <a:ea typeface="+mn-ea"/>
+                <a:cs typeface="+mn-cs"/>
+              </a:defRPr>
+            </a:lvl3pPr>
+            <a:lvl4pPr marL="1600200" indent="-228600" algn="l" defTabSz="457200" rtl="0" eaLnBrk="1" latinLnBrk="0" hangingPunct="1">
+              <a:spcBef>
+                <a:spcPct val="20000"/>
+              </a:spcBef>
+              <a:buFont typeface="Arial"/>
+              <a:buChar char="–"/>
+              <a:defRPr sz="2000" kern="1200">
+                <a:solidFill>
+                  <a:schemeClr val="tx1"/>
+                </a:solidFill>
+                <a:latin typeface="+mn-lt"/>
+                <a:ea typeface="+mn-ea"/>
+                <a:cs typeface="+mn-cs"/>
+              </a:defRPr>
+            </a:lvl4pPr>
+            <a:lvl5pPr marL="2057400" indent="-228600" algn="l" defTabSz="457200" rtl="0" eaLnBrk="1" latinLnBrk="0" hangingPunct="1">
+              <a:spcBef>
+                <a:spcPct val="20000"/>
+              </a:spcBef>
+              <a:buFont typeface="Arial"/>
+              <a:buChar char="»"/>
+              <a:defRPr sz="2000" kern="1200">
+                <a:solidFill>
+                  <a:schemeClr val="tx1"/>
+                </a:solidFill>
+                <a:latin typeface="+mn-lt"/>
+                <a:ea typeface="+mn-ea"/>
+                <a:cs typeface="+mn-cs"/>
+              </a:defRPr>
+            </a:lvl5pPr>
+            <a:lvl6pPr marL="2514600" indent="-228600" algn="l" defTabSz="457200" rtl="0" eaLnBrk="1" latinLnBrk="0" hangingPunct="1">
+              <a:spcBef>
+                <a:spcPct val="20000"/>
+              </a:spcBef>
+              <a:buFont typeface="Arial"/>
+              <a:buChar char="•"/>
+              <a:defRPr sz="2000" kern="1200">
+                <a:solidFill>
+                  <a:schemeClr val="tx1"/>
+                </a:solidFill>
+                <a:latin typeface="+mn-lt"/>
+                <a:ea typeface="+mn-ea"/>
+                <a:cs typeface="+mn-cs"/>
+              </a:defRPr>
+            </a:lvl6pPr>
+            <a:lvl7pPr marL="2971800" indent="-228600" algn="l" defTabSz="457200" rtl="0" eaLnBrk="1" latinLnBrk="0" hangingPunct="1">
+              <a:spcBef>
+                <a:spcPct val="20000"/>
+              </a:spcBef>
+              <a:buFont typeface="Arial"/>
+              <a:buChar char="•"/>
+              <a:defRPr sz="2000" kern="1200">
+                <a:solidFill>
+                  <a:schemeClr val="tx1"/>
+                </a:solidFill>
+                <a:latin typeface="+mn-lt"/>
+                <a:ea typeface="+mn-ea"/>
+                <a:cs typeface="+mn-cs"/>
+              </a:defRPr>
+            </a:lvl7pPr>
+            <a:lvl8pPr marL="3429000" indent="-228600" algn="l" defTabSz="457200" rtl="0" eaLnBrk="1" latinLnBrk="0" hangingPunct="1">
+              <a:spcBef>
+                <a:spcPct val="20000"/>
+              </a:spcBef>
+              <a:buFont typeface="Arial"/>
+              <a:buChar char="•"/>
+              <a:defRPr sz="2000" kern="1200">
+                <a:solidFill>
+                  <a:schemeClr val="tx1"/>
+                </a:solidFill>
+                <a:latin typeface="+mn-lt"/>
+                <a:ea typeface="+mn-ea"/>
+                <a:cs typeface="+mn-cs"/>
+              </a:defRPr>
+            </a:lvl8pPr>
+            <a:lvl9pPr marL="3886200" indent="-228600" algn="l" defTabSz="457200" rtl="0" eaLnBrk="1" latinLnBrk="0" hangingPunct="1">
+              <a:spcBef>
+                <a:spcPct val="20000"/>
+              </a:spcBef>
+              <a:buFont typeface="Arial"/>
+              <a:buChar char="•"/>
+              <a:defRPr sz="2000" kern="1200">
+                <a:solidFill>
+                  <a:schemeClr val="tx1"/>
+                </a:solidFill>
+                <a:latin typeface="+mn-lt"/>
+                <a:ea typeface="+mn-ea"/>
+                <a:cs typeface="+mn-cs"/>
+              </a:defRPr>
+            </a:lvl9pPr>
+          </a:lstStyle>
+          <a:p>
+            <a:pPr marL="0" indent="0">
+              <a:buFont typeface="Arial"/>
+              <a:buNone/>
+            </a:pPr>
+            <a:r>
+              <a:rPr lang="en-US" sz="4000" smtClean="0"/>
+              <a:t>BM</a:t>
+            </a:r>
+            <a:endParaRPr lang="en-US" sz="4000" dirty="0"/>
+          </a:p>
+        </p:txBody>
+      </p:sp>
+    </p:spTree>
+    <p:extLst>
+      <p:ext uri="{BB962C8B-B14F-4D97-AF65-F5344CB8AC3E}">
+        <p14:creationId xmlns:p14="http://schemas.microsoft.com/office/powerpoint/2010/main" val="3735596612"/>
+      </p:ext>
+    </p:extLst>
+  </p:cSld>
+  <p:clrMapOvr>
+    <a:masterClrMapping/>
+  </p:clrMapOvr>
+</p:sld>
+</file>
+
+<file path=ppt/slides/slide13.xml><?xml version="1.0" encoding="utf-8"?>
+<p:sld xmlns:a="http://schemas.openxmlformats.org/drawingml/2006/main" xmlns:r="http://schemas.openxmlformats.org/officeDocument/2006/relationships" xmlns:p="http://schemas.openxmlformats.org/presentationml/2006/main">
+  <p:cSld>
+    <p:spTree>
+      <p:nvGrpSpPr>
+        <p:cNvPr id="1" name=""/>
+        <p:cNvGrpSpPr/>
+        <p:nvPr/>
+      </p:nvGrpSpPr>
+      <p:grpSpPr>
+        <a:xfrm>
+          <a:off x="0" y="0"/>
+          <a:ext cx="0" cy="0"/>
+          <a:chOff x="0" y="0"/>
+          <a:chExt cx="0" cy="0"/>
+        </a:xfrm>
+      </p:grpSpPr>
+      <p:sp>
+        <p:nvSpPr>
+          <p:cNvPr id="2" name="Title 1"/>
+          <p:cNvSpPr>
+            <a:spLocks noGrp="1"/>
+          </p:cNvSpPr>
+          <p:nvPr>
+            <p:ph type="title"/>
+          </p:nvPr>
+        </p:nvSpPr>
+        <p:spPr/>
+        <p:txBody>
+          <a:bodyPr>
+            <a:normAutofit/>
+          </a:bodyPr>
+          <a:lstStyle/>
+          <a:p>
+            <a:r>
+              <a:rPr lang="en-US" dirty="0" smtClean="0"/>
+              <a:t>Do bottlenecks affect the variance? </a:t>
+            </a:r>
+            <a:endParaRPr lang="en-US" dirty="0"/>
+          </a:p>
+        </p:txBody>
+      </p:sp>
+      <p:sp>
+        <p:nvSpPr>
+          <p:cNvPr id="4" name="Content Placeholder 2"/>
+          <p:cNvSpPr txBox="1">
+            <a:spLocks/>
+          </p:cNvSpPr>
+          <p:nvPr/>
+        </p:nvSpPr>
+        <p:spPr>
+          <a:xfrm>
+            <a:off x="457200" y="5777983"/>
+            <a:ext cx="1510213" cy="715540"/>
+          </a:xfrm>
+          <a:prstGeom prst="rect">
+            <a:avLst/>
+          </a:prstGeom>
+        </p:spPr>
+        <p:txBody>
+          <a:bodyPr vert="horz" lIns="91440" tIns="45720" rIns="91440" bIns="45720" rtlCol="0">
+            <a:noAutofit/>
+          </a:bodyPr>
+          <a:lstStyle>
+            <a:lvl1pPr marL="342900" indent="-342900" algn="l" defTabSz="457200" rtl="0" eaLnBrk="1" latinLnBrk="0" hangingPunct="1">
+              <a:spcBef>
+                <a:spcPct val="20000"/>
+              </a:spcBef>
+              <a:buFont typeface="Arial"/>
+              <a:buChar char="•"/>
+              <a:defRPr sz="3200" kern="1200">
+                <a:solidFill>
+                  <a:schemeClr val="tx1"/>
+                </a:solidFill>
+                <a:latin typeface="+mn-lt"/>
+                <a:ea typeface="+mn-ea"/>
+                <a:cs typeface="+mn-cs"/>
+              </a:defRPr>
+            </a:lvl1pPr>
+            <a:lvl2pPr marL="742950" indent="-285750" algn="l" defTabSz="457200" rtl="0" eaLnBrk="1" latinLnBrk="0" hangingPunct="1">
+              <a:spcBef>
+                <a:spcPct val="20000"/>
+              </a:spcBef>
+              <a:buFont typeface="Arial"/>
+              <a:buChar char="–"/>
+              <a:defRPr sz="2800" kern="1200">
+                <a:solidFill>
+                  <a:schemeClr val="tx1"/>
+                </a:solidFill>
+                <a:latin typeface="+mn-lt"/>
+                <a:ea typeface="+mn-ea"/>
+                <a:cs typeface="+mn-cs"/>
+              </a:defRPr>
+            </a:lvl2pPr>
+            <a:lvl3pPr marL="1143000" indent="-228600" algn="l" defTabSz="457200" rtl="0" eaLnBrk="1" latinLnBrk="0" hangingPunct="1">
+              <a:spcBef>
+                <a:spcPct val="20000"/>
+              </a:spcBef>
+              <a:buFont typeface="Arial"/>
+              <a:buChar char="•"/>
+              <a:defRPr sz="2400" kern="1200">
+                <a:solidFill>
+                  <a:schemeClr val="tx1"/>
+                </a:solidFill>
+                <a:latin typeface="+mn-lt"/>
+                <a:ea typeface="+mn-ea"/>
+                <a:cs typeface="+mn-cs"/>
+              </a:defRPr>
+            </a:lvl3pPr>
+            <a:lvl4pPr marL="1600200" indent="-228600" algn="l" defTabSz="457200" rtl="0" eaLnBrk="1" latinLnBrk="0" hangingPunct="1">
+              <a:spcBef>
+                <a:spcPct val="20000"/>
+              </a:spcBef>
+              <a:buFont typeface="Arial"/>
+              <a:buChar char="–"/>
+              <a:defRPr sz="2000" kern="1200">
+                <a:solidFill>
+                  <a:schemeClr val="tx1"/>
+                </a:solidFill>
+                <a:latin typeface="+mn-lt"/>
+                <a:ea typeface="+mn-ea"/>
+                <a:cs typeface="+mn-cs"/>
+              </a:defRPr>
+            </a:lvl4pPr>
+            <a:lvl5pPr marL="2057400" indent="-228600" algn="l" defTabSz="457200" rtl="0" eaLnBrk="1" latinLnBrk="0" hangingPunct="1">
+              <a:spcBef>
+                <a:spcPct val="20000"/>
+              </a:spcBef>
+              <a:buFont typeface="Arial"/>
+              <a:buChar char="»"/>
+              <a:defRPr sz="2000" kern="1200">
+                <a:solidFill>
+                  <a:schemeClr val="tx1"/>
+                </a:solidFill>
+                <a:latin typeface="+mn-lt"/>
+                <a:ea typeface="+mn-ea"/>
+                <a:cs typeface="+mn-cs"/>
+              </a:defRPr>
+            </a:lvl5pPr>
+            <a:lvl6pPr marL="2514600" indent="-228600" algn="l" defTabSz="457200" rtl="0" eaLnBrk="1" latinLnBrk="0" hangingPunct="1">
+              <a:spcBef>
+                <a:spcPct val="20000"/>
+              </a:spcBef>
+              <a:buFont typeface="Arial"/>
+              <a:buChar char="•"/>
+              <a:defRPr sz="2000" kern="1200">
+                <a:solidFill>
+                  <a:schemeClr val="tx1"/>
+                </a:solidFill>
+                <a:latin typeface="+mn-lt"/>
+                <a:ea typeface="+mn-ea"/>
+                <a:cs typeface="+mn-cs"/>
+              </a:defRPr>
+            </a:lvl6pPr>
+            <a:lvl7pPr marL="2971800" indent="-228600" algn="l" defTabSz="457200" rtl="0" eaLnBrk="1" latinLnBrk="0" hangingPunct="1">
+              <a:spcBef>
+                <a:spcPct val="20000"/>
+              </a:spcBef>
+              <a:buFont typeface="Arial"/>
+              <a:buChar char="•"/>
+              <a:defRPr sz="2000" kern="1200">
+                <a:solidFill>
+                  <a:schemeClr val="tx1"/>
+                </a:solidFill>
+                <a:latin typeface="+mn-lt"/>
+                <a:ea typeface="+mn-ea"/>
+                <a:cs typeface="+mn-cs"/>
+              </a:defRPr>
+            </a:lvl7pPr>
+            <a:lvl8pPr marL="3429000" indent="-228600" algn="l" defTabSz="457200" rtl="0" eaLnBrk="1" latinLnBrk="0" hangingPunct="1">
+              <a:spcBef>
+                <a:spcPct val="20000"/>
+              </a:spcBef>
+              <a:buFont typeface="Arial"/>
+              <a:buChar char="•"/>
+              <a:defRPr sz="2000" kern="1200">
+                <a:solidFill>
+                  <a:schemeClr val="tx1"/>
+                </a:solidFill>
+                <a:latin typeface="+mn-lt"/>
+                <a:ea typeface="+mn-ea"/>
+                <a:cs typeface="+mn-cs"/>
+              </a:defRPr>
+            </a:lvl8pPr>
+            <a:lvl9pPr marL="3886200" indent="-228600" algn="l" defTabSz="457200" rtl="0" eaLnBrk="1" latinLnBrk="0" hangingPunct="1">
+              <a:spcBef>
+                <a:spcPct val="20000"/>
+              </a:spcBef>
+              <a:buFont typeface="Arial"/>
+              <a:buChar char="•"/>
+              <a:defRPr sz="2000" kern="1200">
+                <a:solidFill>
+                  <a:schemeClr val="tx1"/>
+                </a:solidFill>
+                <a:latin typeface="+mn-lt"/>
+                <a:ea typeface="+mn-ea"/>
+                <a:cs typeface="+mn-cs"/>
+              </a:defRPr>
+            </a:lvl9pPr>
+          </a:lstStyle>
+          <a:p>
+            <a:pPr marL="0" indent="0">
+              <a:buFont typeface="Arial"/>
+              <a:buNone/>
+            </a:pPr>
+            <a:r>
+              <a:rPr lang="en-US" sz="4000" dirty="0" smtClean="0"/>
+              <a:t>BM</a:t>
+            </a:r>
+            <a:endParaRPr lang="en-US" sz="4000" dirty="0"/>
+          </a:p>
+        </p:txBody>
+      </p:sp>
+    </p:spTree>
+    <p:extLst>
+      <p:ext uri="{BB962C8B-B14F-4D97-AF65-F5344CB8AC3E}">
+        <p14:creationId xmlns:p14="http://schemas.microsoft.com/office/powerpoint/2010/main" val="3735596612"/>
+      </p:ext>
+    </p:extLst>
+  </p:cSld>
+  <p:clrMapOvr>
+    <a:masterClrMapping/>
+  </p:clrMapOvr>
+</p:sld>
+</file>
+
+<file path=ppt/slides/slide14.xml><?xml version="1.0" encoding="utf-8"?>
+<p:sld xmlns:a="http://schemas.openxmlformats.org/drawingml/2006/main" xmlns:r="http://schemas.openxmlformats.org/officeDocument/2006/relationships" xmlns:p="http://schemas.openxmlformats.org/presentationml/2006/main">
+  <p:cSld>
+    <p:spTree>
+      <p:nvGrpSpPr>
+        <p:cNvPr id="1" name=""/>
+        <p:cNvGrpSpPr/>
+        <p:nvPr/>
+      </p:nvGrpSpPr>
+      <p:grpSpPr>
+        <a:xfrm>
+          <a:off x="0" y="0"/>
+          <a:ext cx="0" cy="0"/>
+          <a:chOff x="0" y="0"/>
+          <a:chExt cx="0" cy="0"/>
+        </a:xfrm>
+      </p:grpSpPr>
+      <p:sp>
+        <p:nvSpPr>
+          <p:cNvPr id="2" name="Title 1"/>
+          <p:cNvSpPr>
+            <a:spLocks noGrp="1"/>
+          </p:cNvSpPr>
+          <p:nvPr>
+            <p:ph type="title"/>
+          </p:nvPr>
+        </p:nvSpPr>
+        <p:spPr/>
+        <p:txBody>
+          <a:bodyPr>
+            <a:normAutofit/>
+          </a:bodyPr>
+          <a:lstStyle/>
+          <a:p>
+            <a:r>
+              <a:rPr lang="en-US" dirty="0" smtClean="0"/>
+              <a:t>Do bottlenecks affect the variance? </a:t>
+            </a:r>
+            <a:endParaRPr lang="en-US" dirty="0"/>
+          </a:p>
+        </p:txBody>
+      </p:sp>
+      <p:sp>
+        <p:nvSpPr>
+          <p:cNvPr id="4" name="Content Placeholder 2"/>
+          <p:cNvSpPr txBox="1">
+            <a:spLocks/>
+          </p:cNvSpPr>
+          <p:nvPr/>
+        </p:nvSpPr>
+        <p:spPr>
+          <a:xfrm>
+            <a:off x="457200" y="5777983"/>
+            <a:ext cx="1510213" cy="715540"/>
+          </a:xfrm>
+          <a:prstGeom prst="rect">
+            <a:avLst/>
+          </a:prstGeom>
+        </p:spPr>
+        <p:txBody>
+          <a:bodyPr vert="horz" lIns="91440" tIns="45720" rIns="91440" bIns="45720" rtlCol="0">
+            <a:noAutofit/>
+          </a:bodyPr>
+          <a:lstStyle>
+            <a:lvl1pPr marL="342900" indent="-342900" algn="l" defTabSz="457200" rtl="0" eaLnBrk="1" latinLnBrk="0" hangingPunct="1">
+              <a:spcBef>
+                <a:spcPct val="20000"/>
+              </a:spcBef>
+              <a:buFont typeface="Arial"/>
+              <a:buChar char="•"/>
+              <a:defRPr sz="3200" kern="1200">
+                <a:solidFill>
+                  <a:schemeClr val="tx1"/>
+                </a:solidFill>
+                <a:latin typeface="+mn-lt"/>
+                <a:ea typeface="+mn-ea"/>
+                <a:cs typeface="+mn-cs"/>
+              </a:defRPr>
+            </a:lvl1pPr>
+            <a:lvl2pPr marL="742950" indent="-285750" algn="l" defTabSz="457200" rtl="0" eaLnBrk="1" latinLnBrk="0" hangingPunct="1">
+              <a:spcBef>
+                <a:spcPct val="20000"/>
+              </a:spcBef>
+              <a:buFont typeface="Arial"/>
+              <a:buChar char="–"/>
+              <a:defRPr sz="2800" kern="1200">
+                <a:solidFill>
+                  <a:schemeClr val="tx1"/>
+                </a:solidFill>
+                <a:latin typeface="+mn-lt"/>
+                <a:ea typeface="+mn-ea"/>
+                <a:cs typeface="+mn-cs"/>
+              </a:defRPr>
+            </a:lvl2pPr>
+            <a:lvl3pPr marL="1143000" indent="-228600" algn="l" defTabSz="457200" rtl="0" eaLnBrk="1" latinLnBrk="0" hangingPunct="1">
+              <a:spcBef>
+                <a:spcPct val="20000"/>
+              </a:spcBef>
+              <a:buFont typeface="Arial"/>
+              <a:buChar char="•"/>
+              <a:defRPr sz="2400" kern="1200">
+                <a:solidFill>
+                  <a:schemeClr val="tx1"/>
+                </a:solidFill>
+                <a:latin typeface="+mn-lt"/>
+                <a:ea typeface="+mn-ea"/>
+                <a:cs typeface="+mn-cs"/>
+              </a:defRPr>
+            </a:lvl3pPr>
+            <a:lvl4pPr marL="1600200" indent="-228600" algn="l" defTabSz="457200" rtl="0" eaLnBrk="1" latinLnBrk="0" hangingPunct="1">
+              <a:spcBef>
+                <a:spcPct val="20000"/>
+              </a:spcBef>
+              <a:buFont typeface="Arial"/>
+              <a:buChar char="–"/>
+              <a:defRPr sz="2000" kern="1200">
+                <a:solidFill>
+                  <a:schemeClr val="tx1"/>
+                </a:solidFill>
+                <a:latin typeface="+mn-lt"/>
+                <a:ea typeface="+mn-ea"/>
+                <a:cs typeface="+mn-cs"/>
+              </a:defRPr>
+            </a:lvl4pPr>
+            <a:lvl5pPr marL="2057400" indent="-228600" algn="l" defTabSz="457200" rtl="0" eaLnBrk="1" latinLnBrk="0" hangingPunct="1">
+              <a:spcBef>
+                <a:spcPct val="20000"/>
+              </a:spcBef>
+              <a:buFont typeface="Arial"/>
+              <a:buChar char="»"/>
+              <a:defRPr sz="2000" kern="1200">
+                <a:solidFill>
+                  <a:schemeClr val="tx1"/>
+                </a:solidFill>
+                <a:latin typeface="+mn-lt"/>
+                <a:ea typeface="+mn-ea"/>
+                <a:cs typeface="+mn-cs"/>
+              </a:defRPr>
+            </a:lvl5pPr>
+            <a:lvl6pPr marL="2514600" indent="-228600" algn="l" defTabSz="457200" rtl="0" eaLnBrk="1" latinLnBrk="0" hangingPunct="1">
+              <a:spcBef>
+                <a:spcPct val="20000"/>
+              </a:spcBef>
+              <a:buFont typeface="Arial"/>
+              <a:buChar char="•"/>
+              <a:defRPr sz="2000" kern="1200">
+                <a:solidFill>
+                  <a:schemeClr val="tx1"/>
+                </a:solidFill>
+                <a:latin typeface="+mn-lt"/>
+                <a:ea typeface="+mn-ea"/>
+                <a:cs typeface="+mn-cs"/>
+              </a:defRPr>
+            </a:lvl6pPr>
+            <a:lvl7pPr marL="2971800" indent="-228600" algn="l" defTabSz="457200" rtl="0" eaLnBrk="1" latinLnBrk="0" hangingPunct="1">
+              <a:spcBef>
+                <a:spcPct val="20000"/>
+              </a:spcBef>
+              <a:buFont typeface="Arial"/>
+              <a:buChar char="•"/>
+              <a:defRPr sz="2000" kern="1200">
+                <a:solidFill>
+                  <a:schemeClr val="tx1"/>
+                </a:solidFill>
+                <a:latin typeface="+mn-lt"/>
+                <a:ea typeface="+mn-ea"/>
+                <a:cs typeface="+mn-cs"/>
+              </a:defRPr>
+            </a:lvl7pPr>
+            <a:lvl8pPr marL="3429000" indent="-228600" algn="l" defTabSz="457200" rtl="0" eaLnBrk="1" latinLnBrk="0" hangingPunct="1">
+              <a:spcBef>
+                <a:spcPct val="20000"/>
+              </a:spcBef>
+              <a:buFont typeface="Arial"/>
+              <a:buChar char="•"/>
+              <a:defRPr sz="2000" kern="1200">
+                <a:solidFill>
+                  <a:schemeClr val="tx1"/>
+                </a:solidFill>
+                <a:latin typeface="+mn-lt"/>
+                <a:ea typeface="+mn-ea"/>
+                <a:cs typeface="+mn-cs"/>
+              </a:defRPr>
+            </a:lvl8pPr>
+            <a:lvl9pPr marL="3886200" indent="-228600" algn="l" defTabSz="457200" rtl="0" eaLnBrk="1" latinLnBrk="0" hangingPunct="1">
+              <a:spcBef>
+                <a:spcPct val="20000"/>
+              </a:spcBef>
+              <a:buFont typeface="Arial"/>
+              <a:buChar char="•"/>
+              <a:defRPr sz="2000" kern="1200">
+                <a:solidFill>
+                  <a:schemeClr val="tx1"/>
+                </a:solidFill>
+                <a:latin typeface="+mn-lt"/>
+                <a:ea typeface="+mn-ea"/>
+                <a:cs typeface="+mn-cs"/>
+              </a:defRPr>
+            </a:lvl9pPr>
+          </a:lstStyle>
+          <a:p>
+            <a:pPr marL="0" indent="0">
+              <a:buFont typeface="Arial"/>
+              <a:buNone/>
+            </a:pPr>
+            <a:r>
+              <a:rPr lang="en-US" sz="4000" dirty="0" smtClean="0"/>
+              <a:t>OU</a:t>
+            </a:r>
+            <a:endParaRPr lang="en-US" sz="4000" dirty="0"/>
+          </a:p>
+        </p:txBody>
+      </p:sp>
+    </p:spTree>
+    <p:extLst>
+      <p:ext uri="{BB962C8B-B14F-4D97-AF65-F5344CB8AC3E}">
+        <p14:creationId xmlns:p14="http://schemas.microsoft.com/office/powerpoint/2010/main" val="1831224169"/>
+      </p:ext>
+    </p:extLst>
+  </p:cSld>
+  <p:clrMapOvr>
+    <a:masterClrMapping/>
+  </p:clrMapOvr>
+</p:sld>
+</file>
+
+<file path=ppt/slides/slide15.xml><?xml version="1.0" encoding="utf-8"?>
+<p:sld xmlns:a="http://schemas.openxmlformats.org/drawingml/2006/main" xmlns:r="http://schemas.openxmlformats.org/officeDocument/2006/relationships" xmlns:p="http://schemas.openxmlformats.org/presentationml/2006/main">
+  <p:cSld>
+    <p:spTree>
+      <p:nvGrpSpPr>
+        <p:cNvPr id="1" name=""/>
+        <p:cNvGrpSpPr/>
+        <p:nvPr/>
+      </p:nvGrpSpPr>
+      <p:grpSpPr>
+        <a:xfrm>
+          <a:off x="0" y="0"/>
+          <a:ext cx="0" cy="0"/>
+          <a:chOff x="0" y="0"/>
+          <a:chExt cx="0" cy="0"/>
+        </a:xfrm>
+      </p:grpSpPr>
+      <p:sp>
+        <p:nvSpPr>
+          <p:cNvPr id="2" name="Title 1"/>
+          <p:cNvSpPr>
+            <a:spLocks noGrp="1"/>
+          </p:cNvSpPr>
+          <p:nvPr>
+            <p:ph type="title"/>
+          </p:nvPr>
+        </p:nvSpPr>
+        <p:spPr/>
+        <p:txBody>
+          <a:bodyPr>
+            <a:normAutofit/>
+          </a:bodyPr>
+          <a:lstStyle/>
+          <a:p>
+            <a:r>
+              <a:rPr lang="en-US" dirty="0" smtClean="0"/>
+              <a:t>Do bottlenecks affect the variance? </a:t>
+            </a:r>
+            <a:endParaRPr lang="en-US" dirty="0"/>
+          </a:p>
+        </p:txBody>
+      </p:sp>
+      <p:sp>
+        <p:nvSpPr>
+          <p:cNvPr id="4" name="Content Placeholder 2"/>
+          <p:cNvSpPr txBox="1">
+            <a:spLocks/>
+          </p:cNvSpPr>
+          <p:nvPr/>
+        </p:nvSpPr>
+        <p:spPr>
+          <a:xfrm>
+            <a:off x="457200" y="5777983"/>
+            <a:ext cx="1510213" cy="715540"/>
+          </a:xfrm>
+          <a:prstGeom prst="rect">
+            <a:avLst/>
+          </a:prstGeom>
+        </p:spPr>
+        <p:txBody>
+          <a:bodyPr vert="horz" lIns="91440" tIns="45720" rIns="91440" bIns="45720" rtlCol="0">
+            <a:noAutofit/>
+          </a:bodyPr>
+          <a:lstStyle>
+            <a:lvl1pPr marL="342900" indent="-342900" algn="l" defTabSz="457200" rtl="0" eaLnBrk="1" latinLnBrk="0" hangingPunct="1">
+              <a:spcBef>
+                <a:spcPct val="20000"/>
+              </a:spcBef>
+              <a:buFont typeface="Arial"/>
+              <a:buChar char="•"/>
+              <a:defRPr sz="3200" kern="1200">
+                <a:solidFill>
+                  <a:schemeClr val="tx1"/>
+                </a:solidFill>
+                <a:latin typeface="+mn-lt"/>
+                <a:ea typeface="+mn-ea"/>
+                <a:cs typeface="+mn-cs"/>
+              </a:defRPr>
+            </a:lvl1pPr>
+            <a:lvl2pPr marL="742950" indent="-285750" algn="l" defTabSz="457200" rtl="0" eaLnBrk="1" latinLnBrk="0" hangingPunct="1">
+              <a:spcBef>
+                <a:spcPct val="20000"/>
+              </a:spcBef>
+              <a:buFont typeface="Arial"/>
+              <a:buChar char="–"/>
+              <a:defRPr sz="2800" kern="1200">
+                <a:solidFill>
+                  <a:schemeClr val="tx1"/>
+                </a:solidFill>
+                <a:latin typeface="+mn-lt"/>
+                <a:ea typeface="+mn-ea"/>
+                <a:cs typeface="+mn-cs"/>
+              </a:defRPr>
+            </a:lvl2pPr>
+            <a:lvl3pPr marL="1143000" indent="-228600" algn="l" defTabSz="457200" rtl="0" eaLnBrk="1" latinLnBrk="0" hangingPunct="1">
+              <a:spcBef>
+                <a:spcPct val="20000"/>
+              </a:spcBef>
+              <a:buFont typeface="Arial"/>
+              <a:buChar char="•"/>
+              <a:defRPr sz="2400" kern="1200">
+                <a:solidFill>
+                  <a:schemeClr val="tx1"/>
+                </a:solidFill>
+                <a:latin typeface="+mn-lt"/>
+                <a:ea typeface="+mn-ea"/>
+                <a:cs typeface="+mn-cs"/>
+              </a:defRPr>
+            </a:lvl3pPr>
+            <a:lvl4pPr marL="1600200" indent="-228600" algn="l" defTabSz="457200" rtl="0" eaLnBrk="1" latinLnBrk="0" hangingPunct="1">
+              <a:spcBef>
+                <a:spcPct val="20000"/>
+              </a:spcBef>
+              <a:buFont typeface="Arial"/>
+              <a:buChar char="–"/>
+              <a:defRPr sz="2000" kern="1200">
+                <a:solidFill>
+                  <a:schemeClr val="tx1"/>
+                </a:solidFill>
+                <a:latin typeface="+mn-lt"/>
+                <a:ea typeface="+mn-ea"/>
+                <a:cs typeface="+mn-cs"/>
+              </a:defRPr>
+            </a:lvl4pPr>
+            <a:lvl5pPr marL="2057400" indent="-228600" algn="l" defTabSz="457200" rtl="0" eaLnBrk="1" latinLnBrk="0" hangingPunct="1">
+              <a:spcBef>
+                <a:spcPct val="20000"/>
+              </a:spcBef>
+              <a:buFont typeface="Arial"/>
+              <a:buChar char="»"/>
+              <a:defRPr sz="2000" kern="1200">
+                <a:solidFill>
+                  <a:schemeClr val="tx1"/>
+                </a:solidFill>
+                <a:latin typeface="+mn-lt"/>
+                <a:ea typeface="+mn-ea"/>
+                <a:cs typeface="+mn-cs"/>
+              </a:defRPr>
+            </a:lvl5pPr>
+            <a:lvl6pPr marL="2514600" indent="-228600" algn="l" defTabSz="457200" rtl="0" eaLnBrk="1" latinLnBrk="0" hangingPunct="1">
+              <a:spcBef>
+                <a:spcPct val="20000"/>
+              </a:spcBef>
+              <a:buFont typeface="Arial"/>
+              <a:buChar char="•"/>
+              <a:defRPr sz="2000" kern="1200">
+                <a:solidFill>
+                  <a:schemeClr val="tx1"/>
+                </a:solidFill>
+                <a:latin typeface="+mn-lt"/>
+                <a:ea typeface="+mn-ea"/>
+                <a:cs typeface="+mn-cs"/>
+              </a:defRPr>
+            </a:lvl6pPr>
+            <a:lvl7pPr marL="2971800" indent="-228600" algn="l" defTabSz="457200" rtl="0" eaLnBrk="1" latinLnBrk="0" hangingPunct="1">
+              <a:spcBef>
+                <a:spcPct val="20000"/>
+              </a:spcBef>
+              <a:buFont typeface="Arial"/>
+              <a:buChar char="•"/>
+              <a:defRPr sz="2000" kern="1200">
+                <a:solidFill>
+                  <a:schemeClr val="tx1"/>
+                </a:solidFill>
+                <a:latin typeface="+mn-lt"/>
+                <a:ea typeface="+mn-ea"/>
+                <a:cs typeface="+mn-cs"/>
+              </a:defRPr>
+            </a:lvl7pPr>
+            <a:lvl8pPr marL="3429000" indent="-228600" algn="l" defTabSz="457200" rtl="0" eaLnBrk="1" latinLnBrk="0" hangingPunct="1">
+              <a:spcBef>
+                <a:spcPct val="20000"/>
+              </a:spcBef>
+              <a:buFont typeface="Arial"/>
+              <a:buChar char="•"/>
+              <a:defRPr sz="2000" kern="1200">
+                <a:solidFill>
+                  <a:schemeClr val="tx1"/>
+                </a:solidFill>
+                <a:latin typeface="+mn-lt"/>
+                <a:ea typeface="+mn-ea"/>
+                <a:cs typeface="+mn-cs"/>
+              </a:defRPr>
+            </a:lvl8pPr>
+            <a:lvl9pPr marL="3886200" indent="-228600" algn="l" defTabSz="457200" rtl="0" eaLnBrk="1" latinLnBrk="0" hangingPunct="1">
+              <a:spcBef>
+                <a:spcPct val="20000"/>
+              </a:spcBef>
+              <a:buFont typeface="Arial"/>
+              <a:buChar char="•"/>
+              <a:defRPr sz="2000" kern="1200">
+                <a:solidFill>
+                  <a:schemeClr val="tx1"/>
+                </a:solidFill>
+                <a:latin typeface="+mn-lt"/>
+                <a:ea typeface="+mn-ea"/>
+                <a:cs typeface="+mn-cs"/>
+              </a:defRPr>
+            </a:lvl9pPr>
+          </a:lstStyle>
+          <a:p>
+            <a:pPr marL="0" indent="0">
+              <a:buFont typeface="Arial"/>
+              <a:buNone/>
+            </a:pPr>
+            <a:r>
+              <a:rPr lang="en-US" sz="4000" dirty="0" smtClean="0"/>
+              <a:t>OU</a:t>
+            </a:r>
+            <a:endParaRPr lang="en-US" sz="4000" dirty="0"/>
+          </a:p>
+        </p:txBody>
+      </p:sp>
+    </p:spTree>
+    <p:extLst>
+      <p:ext uri="{BB962C8B-B14F-4D97-AF65-F5344CB8AC3E}">
+        <p14:creationId xmlns:p14="http://schemas.microsoft.com/office/powerpoint/2010/main" val="1831224169"/>
+      </p:ext>
+    </p:extLst>
+  </p:cSld>
+  <p:clrMapOvr>
+    <a:masterClrMapping/>
+  </p:clrMapOvr>
+</p:sld>
+</file>
+
+<file path=ppt/slides/slide16.xml><?xml version="1.0" encoding="utf-8"?>
+<p:sld xmlns:a="http://schemas.openxmlformats.org/drawingml/2006/main" xmlns:r="http://schemas.openxmlformats.org/officeDocument/2006/relationships" xmlns:p="http://schemas.openxmlformats.org/presentationml/2006/main">
+  <p:cSld>
+    <p:spTree>
+      <p:nvGrpSpPr>
+        <p:cNvPr id="1" name=""/>
+        <p:cNvGrpSpPr/>
+        <p:nvPr/>
+      </p:nvGrpSpPr>
+      <p:grpSpPr>
+        <a:xfrm>
+          <a:off x="0" y="0"/>
+          <a:ext cx="0" cy="0"/>
+          <a:chOff x="0" y="0"/>
+          <a:chExt cx="0" cy="0"/>
+        </a:xfrm>
+      </p:grpSpPr>
+      <p:sp>
+        <p:nvSpPr>
+          <p:cNvPr id="2" name="Title 1"/>
+          <p:cNvSpPr>
+            <a:spLocks noGrp="1"/>
+          </p:cNvSpPr>
+          <p:nvPr>
+            <p:ph type="title"/>
+          </p:nvPr>
+        </p:nvSpPr>
+        <p:spPr/>
+        <p:txBody>
+          <a:bodyPr>
+            <a:normAutofit/>
+          </a:bodyPr>
+          <a:lstStyle/>
+          <a:p>
+            <a:r>
+              <a:rPr lang="en-US" dirty="0" smtClean="0"/>
+              <a:t>Do bottlenecks affect the variance? </a:t>
+            </a:r>
+            <a:endParaRPr lang="en-US" dirty="0"/>
+          </a:p>
+        </p:txBody>
+      </p:sp>
+      <p:sp>
+        <p:nvSpPr>
+          <p:cNvPr id="4" name="Content Placeholder 2"/>
+          <p:cNvSpPr txBox="1">
+            <a:spLocks/>
+          </p:cNvSpPr>
+          <p:nvPr/>
+        </p:nvSpPr>
+        <p:spPr>
+          <a:xfrm>
+            <a:off x="457200" y="5777983"/>
+            <a:ext cx="1510213" cy="715540"/>
+          </a:xfrm>
+          <a:prstGeom prst="rect">
+            <a:avLst/>
+          </a:prstGeom>
+        </p:spPr>
+        <p:txBody>
+          <a:bodyPr vert="horz" lIns="91440" tIns="45720" rIns="91440" bIns="45720" rtlCol="0">
+            <a:noAutofit/>
+          </a:bodyPr>
+          <a:lstStyle>
+            <a:lvl1pPr marL="342900" indent="-342900" algn="l" defTabSz="457200" rtl="0" eaLnBrk="1" latinLnBrk="0" hangingPunct="1">
+              <a:spcBef>
+                <a:spcPct val="20000"/>
+              </a:spcBef>
+              <a:buFont typeface="Arial"/>
+              <a:buChar char="•"/>
+              <a:defRPr sz="3200" kern="1200">
+                <a:solidFill>
+                  <a:schemeClr val="tx1"/>
+                </a:solidFill>
+                <a:latin typeface="+mn-lt"/>
+                <a:ea typeface="+mn-ea"/>
+                <a:cs typeface="+mn-cs"/>
+              </a:defRPr>
+            </a:lvl1pPr>
+            <a:lvl2pPr marL="742950" indent="-285750" algn="l" defTabSz="457200" rtl="0" eaLnBrk="1" latinLnBrk="0" hangingPunct="1">
+              <a:spcBef>
+                <a:spcPct val="20000"/>
+              </a:spcBef>
+              <a:buFont typeface="Arial"/>
+              <a:buChar char="–"/>
+              <a:defRPr sz="2800" kern="1200">
+                <a:solidFill>
+                  <a:schemeClr val="tx1"/>
+                </a:solidFill>
+                <a:latin typeface="+mn-lt"/>
+                <a:ea typeface="+mn-ea"/>
+                <a:cs typeface="+mn-cs"/>
+              </a:defRPr>
+            </a:lvl2pPr>
+            <a:lvl3pPr marL="1143000" indent="-228600" algn="l" defTabSz="457200" rtl="0" eaLnBrk="1" latinLnBrk="0" hangingPunct="1">
+              <a:spcBef>
+                <a:spcPct val="20000"/>
+              </a:spcBef>
+              <a:buFont typeface="Arial"/>
+              <a:buChar char="•"/>
+              <a:defRPr sz="2400" kern="1200">
+                <a:solidFill>
+                  <a:schemeClr val="tx1"/>
+                </a:solidFill>
+                <a:latin typeface="+mn-lt"/>
+                <a:ea typeface="+mn-ea"/>
+                <a:cs typeface="+mn-cs"/>
+              </a:defRPr>
+            </a:lvl3pPr>
+            <a:lvl4pPr marL="1600200" indent="-228600" algn="l" defTabSz="457200" rtl="0" eaLnBrk="1" latinLnBrk="0" hangingPunct="1">
+              <a:spcBef>
+                <a:spcPct val="20000"/>
+              </a:spcBef>
+              <a:buFont typeface="Arial"/>
+              <a:buChar char="–"/>
+              <a:defRPr sz="2000" kern="1200">
+                <a:solidFill>
+                  <a:schemeClr val="tx1"/>
+                </a:solidFill>
+                <a:latin typeface="+mn-lt"/>
+                <a:ea typeface="+mn-ea"/>
+                <a:cs typeface="+mn-cs"/>
+              </a:defRPr>
+            </a:lvl4pPr>
+            <a:lvl5pPr marL="2057400" indent="-228600" algn="l" defTabSz="457200" rtl="0" eaLnBrk="1" latinLnBrk="0" hangingPunct="1">
+              <a:spcBef>
+                <a:spcPct val="20000"/>
+              </a:spcBef>
+              <a:buFont typeface="Arial"/>
+              <a:buChar char="»"/>
+              <a:defRPr sz="2000" kern="1200">
+                <a:solidFill>
+                  <a:schemeClr val="tx1"/>
+                </a:solidFill>
+                <a:latin typeface="+mn-lt"/>
+                <a:ea typeface="+mn-ea"/>
+                <a:cs typeface="+mn-cs"/>
+              </a:defRPr>
+            </a:lvl5pPr>
+            <a:lvl6pPr marL="2514600" indent="-228600" algn="l" defTabSz="457200" rtl="0" eaLnBrk="1" latinLnBrk="0" hangingPunct="1">
+              <a:spcBef>
+                <a:spcPct val="20000"/>
+              </a:spcBef>
+              <a:buFont typeface="Arial"/>
+              <a:buChar char="•"/>
+              <a:defRPr sz="2000" kern="1200">
+                <a:solidFill>
+                  <a:schemeClr val="tx1"/>
+                </a:solidFill>
+                <a:latin typeface="+mn-lt"/>
+                <a:ea typeface="+mn-ea"/>
+                <a:cs typeface="+mn-cs"/>
+              </a:defRPr>
+            </a:lvl6pPr>
+            <a:lvl7pPr marL="2971800" indent="-228600" algn="l" defTabSz="457200" rtl="0" eaLnBrk="1" latinLnBrk="0" hangingPunct="1">
+              <a:spcBef>
+                <a:spcPct val="20000"/>
+              </a:spcBef>
+              <a:buFont typeface="Arial"/>
+              <a:buChar char="•"/>
+              <a:defRPr sz="2000" kern="1200">
+                <a:solidFill>
+                  <a:schemeClr val="tx1"/>
+                </a:solidFill>
+                <a:latin typeface="+mn-lt"/>
+                <a:ea typeface="+mn-ea"/>
+                <a:cs typeface="+mn-cs"/>
+              </a:defRPr>
+            </a:lvl7pPr>
+            <a:lvl8pPr marL="3429000" indent="-228600" algn="l" defTabSz="457200" rtl="0" eaLnBrk="1" latinLnBrk="0" hangingPunct="1">
+              <a:spcBef>
+                <a:spcPct val="20000"/>
+              </a:spcBef>
+              <a:buFont typeface="Arial"/>
+              <a:buChar char="•"/>
+              <a:defRPr sz="2000" kern="1200">
+                <a:solidFill>
+                  <a:schemeClr val="tx1"/>
+                </a:solidFill>
+                <a:latin typeface="+mn-lt"/>
+                <a:ea typeface="+mn-ea"/>
+                <a:cs typeface="+mn-cs"/>
+              </a:defRPr>
+            </a:lvl8pPr>
+            <a:lvl9pPr marL="3886200" indent="-228600" algn="l" defTabSz="457200" rtl="0" eaLnBrk="1" latinLnBrk="0" hangingPunct="1">
+              <a:spcBef>
+                <a:spcPct val="20000"/>
+              </a:spcBef>
+              <a:buFont typeface="Arial"/>
+              <a:buChar char="•"/>
+              <a:defRPr sz="2000" kern="1200">
+                <a:solidFill>
+                  <a:schemeClr val="tx1"/>
+                </a:solidFill>
+                <a:latin typeface="+mn-lt"/>
+                <a:ea typeface="+mn-ea"/>
+                <a:cs typeface="+mn-cs"/>
+              </a:defRPr>
+            </a:lvl9pPr>
+          </a:lstStyle>
+          <a:p>
+            <a:pPr marL="0" indent="0">
+              <a:buFont typeface="Arial"/>
+              <a:buNone/>
+            </a:pPr>
+            <a:r>
+              <a:rPr lang="en-US" sz="4000" dirty="0" smtClean="0"/>
+              <a:t>OU</a:t>
+            </a:r>
+            <a:endParaRPr lang="en-US" sz="4000" dirty="0"/>
+          </a:p>
+        </p:txBody>
+      </p:sp>
+    </p:spTree>
+    <p:extLst>
+      <p:ext uri="{BB962C8B-B14F-4D97-AF65-F5344CB8AC3E}">
+        <p14:creationId xmlns:p14="http://schemas.microsoft.com/office/powerpoint/2010/main" val="3735596612"/>
+      </p:ext>
+    </p:extLst>
+  </p:cSld>
+  <p:clrMapOvr>
+    <a:masterClrMapping/>
+  </p:clrMapOvr>
+</p:sld>
+</file>
+
+<file path=ppt/slides/slide17.xml><?xml version="1.0" encoding="utf-8"?>
+<p:sld xmlns:a="http://schemas.openxmlformats.org/drawingml/2006/main" xmlns:r="http://schemas.openxmlformats.org/officeDocument/2006/relationships" xmlns:p="http://schemas.openxmlformats.org/presentationml/2006/main">
+  <p:cSld>
+    <p:spTree>
+      <p:nvGrpSpPr>
+        <p:cNvPr id="1" name=""/>
+        <p:cNvGrpSpPr/>
+        <p:nvPr/>
+      </p:nvGrpSpPr>
+      <p:grpSpPr>
+        <a:xfrm>
+          <a:off x="0" y="0"/>
+          <a:ext cx="0" cy="0"/>
+          <a:chOff x="0" y="0"/>
+          <a:chExt cx="0" cy="0"/>
+        </a:xfrm>
+      </p:grpSpPr>
+      <p:sp>
+        <p:nvSpPr>
+          <p:cNvPr id="2" name="Title 1"/>
+          <p:cNvSpPr>
+            <a:spLocks noGrp="1"/>
+          </p:cNvSpPr>
+          <p:nvPr>
+            <p:ph type="title"/>
+          </p:nvPr>
+        </p:nvSpPr>
+        <p:spPr/>
+        <p:txBody>
+          <a:bodyPr/>
+          <a:lstStyle/>
+          <a:p>
+            <a:r>
+              <a:rPr lang="en-US" dirty="0" smtClean="0"/>
+              <a:t>Summary</a:t>
+            </a:r>
+            <a:endParaRPr lang="en-US" dirty="0"/>
+          </a:p>
+        </p:txBody>
+      </p:sp>
+      <p:sp>
+        <p:nvSpPr>
+          <p:cNvPr id="3" name="Content Placeholder 2"/>
+          <p:cNvSpPr>
+            <a:spLocks noGrp="1"/>
+          </p:cNvSpPr>
+          <p:nvPr>
+            <p:ph idx="1"/>
+          </p:nvPr>
+        </p:nvSpPr>
+        <p:spPr/>
+        <p:txBody>
+          <a:bodyPr/>
+          <a:lstStyle/>
+          <a:p>
+            <a:endParaRPr lang="en-US" dirty="0"/>
+          </a:p>
+        </p:txBody>
+      </p:sp>
+    </p:spTree>
+    <p:extLst>
+      <p:ext uri="{BB962C8B-B14F-4D97-AF65-F5344CB8AC3E}">
+        <p14:creationId xmlns:p14="http://schemas.microsoft.com/office/powerpoint/2010/main" val="1588106317"/>
+      </p:ext>
+    </p:extLst>
+  </p:cSld>
+  <p:clrMapOvr>
+    <a:masterClrMapping/>
+  </p:clrMapOvr>
+</p:sld>
+</file>
+
+<file path=ppt/slides/slide18.xml><?xml version="1.0" encoding="utf-8"?>
+<p:sld xmlns:a="http://schemas.openxmlformats.org/drawingml/2006/main" xmlns:r="http://schemas.openxmlformats.org/officeDocument/2006/relationships" xmlns:p="http://schemas.openxmlformats.org/presentationml/2006/main">
+  <p:cSld>
+    <p:spTree>
+      <p:nvGrpSpPr>
+        <p:cNvPr id="1" name=""/>
+        <p:cNvGrpSpPr/>
+        <p:nvPr/>
+      </p:nvGrpSpPr>
+      <p:grpSpPr>
+        <a:xfrm>
+          <a:off x="0" y="0"/>
+          <a:ext cx="0" cy="0"/>
+          <a:chOff x="0" y="0"/>
+          <a:chExt cx="0" cy="0"/>
+        </a:xfrm>
+      </p:grpSpPr>
+      <p:sp>
+        <p:nvSpPr>
+          <p:cNvPr id="2" name="Title 1"/>
+          <p:cNvSpPr>
+            <a:spLocks noGrp="1"/>
+          </p:cNvSpPr>
+          <p:nvPr>
+            <p:ph type="title"/>
+          </p:nvPr>
+        </p:nvSpPr>
+        <p:spPr/>
+        <p:txBody>
+          <a:bodyPr/>
+          <a:lstStyle/>
+          <a:p>
+            <a:r>
+              <a:rPr lang="en-US" dirty="0" smtClean="0"/>
+              <a:t>Problems</a:t>
+            </a:r>
+            <a:endParaRPr lang="en-US" dirty="0"/>
+          </a:p>
+        </p:txBody>
+      </p:sp>
+      <p:sp>
+        <p:nvSpPr>
+          <p:cNvPr id="3" name="Content Placeholder 2"/>
+          <p:cNvSpPr>
+            <a:spLocks noGrp="1"/>
+          </p:cNvSpPr>
+          <p:nvPr>
+            <p:ph idx="1"/>
+          </p:nvPr>
+        </p:nvSpPr>
+        <p:spPr/>
+        <p:txBody>
+          <a:bodyPr/>
+          <a:lstStyle/>
+          <a:p>
+            <a:r>
+              <a:rPr lang="en-US" dirty="0" smtClean="0"/>
+              <a:t>Need more realistic values </a:t>
+            </a:r>
+          </a:p>
+          <a:p>
+            <a:endParaRPr lang="en-US" dirty="0"/>
+          </a:p>
+        </p:txBody>
+      </p:sp>
+    </p:spTree>
+    <p:extLst>
+      <p:ext uri="{BB962C8B-B14F-4D97-AF65-F5344CB8AC3E}">
+        <p14:creationId xmlns:p14="http://schemas.microsoft.com/office/powerpoint/2010/main" val="1980410066"/>
+      </p:ext>
+    </p:extLst>
+  </p:cSld>
+  <p:clrMapOvr>
+    <a:masterClrMapping/>
+  </p:clrMapOvr>
+</p:sld>
+</file>
+
 <file path=ppt/slides/slide2.xml><?xml version="1.0" encoding="utf-8"?>
 <p:sld xmlns:a="http://schemas.openxmlformats.org/drawingml/2006/main" xmlns:r="http://schemas.openxmlformats.org/officeDocument/2006/relationships" xmlns:p="http://schemas.openxmlformats.org/presentationml/2006/main">
   <p:cSld>
@@ -3324,7 +4778,11 @@
           <a:lstStyle/>
           <a:p>
             <a:r>
-              <a:rPr lang="en-US" dirty="0" smtClean="0"/>
+              <a:rPr lang="en-US" dirty="0" smtClean="0">
+                <a:solidFill>
+                  <a:srgbClr val="FF0000"/>
+                </a:solidFill>
+              </a:rPr>
               <a:t>No constraints</a:t>
             </a:r>
           </a:p>
@@ -3407,11 +4865,7 @@
           <a:p>
             <a:r>
               <a:rPr lang="en-US" dirty="0" smtClean="0"/>
-              <a:t>Ornstein-</a:t>
-            </a:r>
-            <a:r>
-              <a:rPr lang="en-US" dirty="0" err="1" smtClean="0"/>
-              <a:t>Uhlenbeck</a:t>
+              <a:t>Brownian Motion</a:t>
             </a:r>
             <a:endParaRPr lang="en-US" dirty="0"/>
           </a:p>
@@ -3429,121 +4883,75 @@
         </p:nvSpPr>
         <p:spPr>
           <a:xfrm>
-            <a:off x="457200" y="1600200"/>
-            <a:ext cx="3263000" cy="4525963"/>
+            <a:off x="457200" y="1671755"/>
+            <a:ext cx="3000306" cy="3193914"/>
           </a:xfrm>
         </p:spPr>
         <p:txBody>
-          <a:bodyPr>
-            <a:normAutofit fontScale="92500" lnSpcReduction="10000"/>
-          </a:bodyPr>
-          <a:lstStyle/>
-          <a:p>
-            <a:r>
-              <a:rPr lang="en-US" sz="3500" dirty="0" smtClean="0"/>
-              <a:t>“Rubber band” soft-bounds</a:t>
-            </a:r>
-          </a:p>
-          <a:p>
-            <a:r>
-              <a:rPr lang="el-GR" sz="3500" dirty="0" smtClean="0"/>
+          <a:bodyPr/>
+          <a:lstStyle/>
+          <a:p>
+            <a:r>
+              <a:rPr lang="en-US" dirty="0" smtClean="0"/>
+              <a:t>No constraints</a:t>
+            </a:r>
+          </a:p>
+          <a:p>
+            <a:r>
+              <a:rPr lang="el-GR" dirty="0" smtClean="0">
+                <a:solidFill>
+                  <a:srgbClr val="FF0000"/>
+                </a:solidFill>
+              </a:rPr>
               <a:t>σ</a:t>
             </a:r>
             <a:r>
-              <a:rPr lang="el-GR" sz="3500" baseline="30000" dirty="0" smtClean="0"/>
+              <a:rPr lang="el-GR" baseline="30000" dirty="0" smtClean="0">
+                <a:solidFill>
+                  <a:srgbClr val="FF0000"/>
+                </a:solidFill>
+              </a:rPr>
               <a:t>2</a:t>
             </a:r>
             <a:r>
-              <a:rPr lang="en-US" sz="3500" dirty="0" smtClean="0"/>
+              <a:rPr lang="en-US" dirty="0" smtClean="0">
+                <a:solidFill>
+                  <a:srgbClr val="FF0000"/>
+                </a:solidFill>
+              </a:rPr>
               <a:t>: rate or </a:t>
             </a:r>
             <a:r>
-              <a:rPr lang="en-US" sz="3500" dirty="0" err="1" smtClean="0"/>
+              <a:rPr lang="en-US" dirty="0" err="1" smtClean="0">
+                <a:solidFill>
+                  <a:srgbClr val="FF0000"/>
+                </a:solidFill>
+              </a:rPr>
               <a:t>sd</a:t>
             </a:r>
-            <a:endParaRPr lang="en-US" sz="3500" baseline="30000" dirty="0" smtClean="0"/>
-          </a:p>
-          <a:p>
-            <a:r>
-              <a:rPr lang="el-GR" sz="3500" i="0" dirty="0" smtClean="0">
-                <a:ea typeface="Lucida Grande"/>
-                <a:cs typeface="Lucida Grande"/>
-              </a:rPr>
+            <a:endParaRPr lang="en-US" dirty="0" smtClean="0">
+              <a:solidFill>
+                <a:srgbClr val="FF0000"/>
+              </a:solidFill>
+            </a:endParaRPr>
+          </a:p>
+          <a:p>
+            <a:r>
+              <a:rPr lang="el-GR" dirty="0" smtClean="0"/>
               <a:t>μ</a:t>
             </a:r>
             <a:r>
-              <a:rPr lang="en-US" sz="3500" dirty="0" smtClean="0">
-                <a:ea typeface="Lucida Grande"/>
-                <a:cs typeface="Lucida Grande"/>
-              </a:rPr>
+              <a:rPr lang="en-US" dirty="0" smtClean="0"/>
               <a:t>: mean</a:t>
             </a:r>
-            <a:endParaRPr lang="en-US" sz="3500" dirty="0" smtClean="0"/>
-          </a:p>
-          <a:p>
-            <a:r>
-              <a:rPr lang="el-GR" sz="3500" i="0" dirty="0" smtClean="0">
-                <a:ea typeface="Lucida Grande"/>
-                <a:cs typeface="Lucida Grande"/>
-              </a:rPr>
-              <a:t>θ</a:t>
-            </a:r>
-            <a:r>
-              <a:rPr lang="en-US" sz="3500" i="0" dirty="0" smtClean="0">
-                <a:ea typeface="Lucida Grande"/>
-                <a:cs typeface="Lucida Grande"/>
-              </a:rPr>
-              <a:t>: rate of mean-reversion</a:t>
-            </a:r>
-            <a:endParaRPr lang="en-US" sz="3500" dirty="0" smtClean="0"/>
-          </a:p>
-          <a:p>
-            <a:pPr lvl="1"/>
-            <a:r>
-              <a:rPr lang="el-GR" sz="1900" dirty="0" smtClean="0"/>
-              <a:t>θ</a:t>
-            </a:r>
-            <a:r>
-              <a:rPr lang="en-US" sz="1900" dirty="0" smtClean="0"/>
-              <a:t> = 0</a:t>
-            </a:r>
-          </a:p>
-          <a:p>
-            <a:pPr lvl="2"/>
-            <a:r>
-              <a:rPr lang="en-US" sz="1900" dirty="0" smtClean="0"/>
-              <a:t>BM</a:t>
-            </a:r>
-          </a:p>
-          <a:p>
-            <a:pPr lvl="1"/>
-            <a:r>
-              <a:rPr lang="el-GR" sz="1900" dirty="0" smtClean="0"/>
-              <a:t>θ</a:t>
-            </a:r>
-            <a:r>
-              <a:rPr lang="en-US" sz="1900" dirty="0" smtClean="0"/>
-              <a:t> = 1 </a:t>
-            </a:r>
-            <a:endParaRPr lang="en-US" sz="1900" dirty="0"/>
-          </a:p>
-          <a:p>
-            <a:pPr lvl="2"/>
-            <a:r>
-              <a:rPr lang="en-US" sz="1900" dirty="0" smtClean="0"/>
-              <a:t>Back to μ</a:t>
-            </a:r>
-          </a:p>
-          <a:p>
-            <a:pPr lvl="2"/>
-            <a:endParaRPr lang="en-US" dirty="0" smtClean="0"/>
+            <a:endParaRPr lang="en-US" dirty="0"/>
           </a:p>
         </p:txBody>
       </p:sp>
     </p:spTree>
     <p:extLst>
       <p:ext uri="{BB962C8B-B14F-4D97-AF65-F5344CB8AC3E}">
-        <p14:creationId xmlns:p14="http://schemas.microsoft.com/office/powerpoint/2010/main" val="356588586"/>
+        <p14:creationId xmlns:p14="http://schemas.microsoft.com/office/powerpoint/2010/main" val="1098398276"/>
       </p:ext>
     </p:extLst>
   </p:cSld>
@@ -3587,7 +4995,7 @@
           <a:p>
             <a:r>
               <a:rPr lang="en-US" dirty="0" smtClean="0"/>
-              <a:t>How do we use BM and OU?</a:t>
+              <a:t>Brownian Motion</a:t>
             </a:r>
             <a:endParaRPr lang="en-US" dirty="0"/>
           </a:p>
@@ -3603,23 +5011,69 @@
             <p:ph idx="1"/>
           </p:nvPr>
         </p:nvSpPr>
-        <p:spPr/>
-        <p:txBody>
-          <a:bodyPr/>
-          <a:lstStyle/>
-          <a:p>
-            <a:r>
-              <a:rPr lang="en-US" smtClean="0"/>
-              <a:t>To estimate</a:t>
-            </a:r>
-            <a:endParaRPr lang="en-US" dirty="0"/>
+        <p:spPr>
+          <a:xfrm>
+            <a:off x="457200" y="1671755"/>
+            <a:ext cx="3000306" cy="3193914"/>
+          </a:xfrm>
+        </p:spPr>
+        <p:txBody>
+          <a:bodyPr/>
+          <a:lstStyle/>
+          <a:p>
+            <a:r>
+              <a:rPr lang="en-US" dirty="0" smtClean="0"/>
+              <a:t>No constraints</a:t>
+            </a:r>
+          </a:p>
+          <a:p>
+            <a:r>
+              <a:rPr lang="el-GR" dirty="0" smtClean="0"/>
+              <a:t>σ</a:t>
+            </a:r>
+            <a:r>
+              <a:rPr lang="el-GR" baseline="30000" dirty="0" smtClean="0"/>
+              <a:t>2</a:t>
+            </a:r>
+            <a:r>
+              <a:rPr lang="en-US" dirty="0" smtClean="0"/>
+              <a:t>: rate or </a:t>
+            </a:r>
+            <a:r>
+              <a:rPr lang="en-US" dirty="0" err="1" smtClean="0"/>
+              <a:t>sd</a:t>
+            </a:r>
+            <a:endParaRPr lang="en-US" dirty="0" smtClean="0"/>
+          </a:p>
+          <a:p>
+            <a:r>
+              <a:rPr lang="el-GR" dirty="0" smtClean="0">
+                <a:solidFill>
+                  <a:srgbClr val="FF0000"/>
+                </a:solidFill>
+              </a:rPr>
+              <a:t>μ</a:t>
+            </a:r>
+            <a:r>
+              <a:rPr lang="en-US" dirty="0" smtClean="0">
+                <a:solidFill>
+                  <a:srgbClr val="FF0000"/>
+                </a:solidFill>
+              </a:rPr>
+              <a:t>: mean</a:t>
+            </a:r>
+            <a:endParaRPr lang="en-US" dirty="0">
+              <a:solidFill>
+                <a:srgbClr val="FF0000"/>
+              </a:solidFill>
+            </a:endParaRPr>
           </a:p>
         </p:txBody>
       </p:sp>
     </p:spTree>
     <p:extLst>
       <p:ext uri="{BB962C8B-B14F-4D97-AF65-F5344CB8AC3E}">
-        <p14:creationId xmlns:p14="http://schemas.microsoft.com/office/powerpoint/2010/main" val="955027292"/>
+        <p14:creationId xmlns:p14="http://schemas.microsoft.com/office/powerpoint/2010/main" val="1098398276"/>
       </p:ext>
     </p:extLst>
   </p:cSld>
@@ -3658,42 +5112,152 @@
         </p:nvSpPr>
         <p:spPr/>
         <p:txBody>
+          <a:bodyPr/>
+          <a:lstStyle/>
+          <a:p>
+            <a:r>
+              <a:rPr lang="en-US" dirty="0" smtClean="0"/>
+              <a:t>Ornstein-</a:t>
+            </a:r>
+            <a:r>
+              <a:rPr lang="en-US" dirty="0" err="1" smtClean="0"/>
+              <a:t>Uhlenbeck</a:t>
+            </a:r>
+            <a:endParaRPr lang="en-US" dirty="0"/>
+          </a:p>
+        </p:txBody>
+      </p:sp>
+      <p:sp>
+        <p:nvSpPr>
+          <p:cNvPr id="3" name="Content Placeholder 2"/>
+          <p:cNvSpPr>
+            <a:spLocks noGrp="1"/>
+          </p:cNvSpPr>
+          <p:nvPr>
+            <p:ph idx="1"/>
+          </p:nvPr>
+        </p:nvSpPr>
+        <p:spPr>
+          <a:xfrm>
+            <a:off x="457200" y="1600200"/>
+            <a:ext cx="3263000" cy="4525963"/>
+          </a:xfrm>
+        </p:spPr>
+        <p:txBody>
           <a:bodyPr>
-            <a:normAutofit fontScale="90000"/>
+            <a:normAutofit fontScale="92500" lnSpcReduction="10000"/>
           </a:bodyPr>
           <a:lstStyle/>
           <a:p>
             <a:r>
-              <a:rPr lang="en-US" dirty="0" smtClean="0"/>
-              <a:t>Does population structure—bottleneck—affect the variance? </a:t>
-            </a:r>
-            <a:endParaRPr lang="en-US" dirty="0"/>
-          </a:p>
-        </p:txBody>
-      </p:sp>
-      <p:sp>
-        <p:nvSpPr>
-          <p:cNvPr id="3" name="Content Placeholder 2"/>
-          <p:cNvSpPr>
-            <a:spLocks noGrp="1"/>
-          </p:cNvSpPr>
-          <p:nvPr>
-            <p:ph idx="1"/>
-          </p:nvPr>
-        </p:nvSpPr>
-        <p:spPr/>
-        <p:txBody>
-          <a:bodyPr/>
-          <a:lstStyle/>
-          <a:p>
-            <a:endParaRPr lang="en-US" dirty="0"/>
+              <a:rPr lang="en-US" sz="3500" dirty="0" smtClean="0">
+                <a:solidFill>
+                  <a:srgbClr val="FF0000"/>
+                </a:solidFill>
+              </a:rPr>
+              <a:t>“Rubber band” soft-bounds</a:t>
+            </a:r>
+          </a:p>
+          <a:p>
+            <a:r>
+              <a:rPr lang="el-GR" sz="3500" dirty="0" smtClean="0"/>
+              <a:t>σ</a:t>
+            </a:r>
+            <a:r>
+              <a:rPr lang="el-GR" sz="3500" baseline="30000" dirty="0" smtClean="0"/>
+              <a:t>2</a:t>
+            </a:r>
+            <a:r>
+              <a:rPr lang="en-US" sz="3500" dirty="0" smtClean="0"/>
+              <a:t>: rate or </a:t>
+            </a:r>
+            <a:r>
+              <a:rPr lang="en-US" sz="3500" dirty="0" err="1" smtClean="0"/>
+              <a:t>sd</a:t>
+            </a:r>
+            <a:endParaRPr lang="en-US" sz="3500" baseline="30000" dirty="0" smtClean="0"/>
+          </a:p>
+          <a:p>
+            <a:r>
+              <a:rPr lang="el-GR" sz="3500" i="0" dirty="0" smtClean="0">
+                <a:ea typeface="Lucida Grande"/>
+                <a:cs typeface="Lucida Grande"/>
+              </a:rPr>
+              <a:t>μ</a:t>
+            </a:r>
+            <a:r>
+              <a:rPr lang="en-US" sz="3500" dirty="0" smtClean="0">
+                <a:ea typeface="Lucida Grande"/>
+                <a:cs typeface="Lucida Grande"/>
+              </a:rPr>
+              <a:t>: mean</a:t>
+            </a:r>
+            <a:endParaRPr lang="en-US" sz="3500" dirty="0" smtClean="0"/>
+          </a:p>
+          <a:p>
+            <a:r>
+              <a:rPr lang="el-GR" sz="3500" i="0" dirty="0" smtClean="0">
+                <a:ea typeface="Lucida Grande"/>
+                <a:cs typeface="Lucida Grande"/>
+              </a:rPr>
+              <a:t>θ</a:t>
+            </a:r>
+            <a:r>
+              <a:rPr lang="en-US" sz="3500" i="0" dirty="0" smtClean="0">
+                <a:ea typeface="Lucida Grande"/>
+                <a:cs typeface="Lucida Grande"/>
+              </a:rPr>
+              <a:t>: rate of mean-reversion</a:t>
+            </a:r>
+            <a:endParaRPr lang="en-US" sz="3500" dirty="0" smtClean="0"/>
+          </a:p>
+          <a:p>
+            <a:pPr lvl="1"/>
+            <a:r>
+              <a:rPr lang="el-GR" sz="1900" dirty="0" smtClean="0"/>
+              <a:t>θ</a:t>
+            </a:r>
+            <a:r>
+              <a:rPr lang="en-US" sz="1900" dirty="0" smtClean="0"/>
+              <a:t> = 0</a:t>
+            </a:r>
+          </a:p>
+          <a:p>
+            <a:pPr lvl="2"/>
+            <a:r>
+              <a:rPr lang="en-US" sz="1900" dirty="0" smtClean="0"/>
+              <a:t>BM</a:t>
+            </a:r>
+          </a:p>
+          <a:p>
+            <a:pPr lvl="1"/>
+            <a:r>
+              <a:rPr lang="el-GR" sz="1900" dirty="0" smtClean="0"/>
+              <a:t>θ</a:t>
+            </a:r>
+            <a:r>
+              <a:rPr lang="en-US" sz="1900" dirty="0" smtClean="0"/>
+              <a:t> = 1 </a:t>
+            </a:r>
+            <a:endParaRPr lang="en-US" sz="1900" dirty="0"/>
+          </a:p>
+          <a:p>
+            <a:pPr lvl="2"/>
+            <a:r>
+              <a:rPr lang="en-US" sz="1900" dirty="0" smtClean="0"/>
+              <a:t>Back to μ</a:t>
+            </a:r>
+          </a:p>
+          <a:p>
+            <a:pPr lvl="2"/>
+            <a:endParaRPr lang="en-US" dirty="0" smtClean="0"/>
           </a:p>
         </p:txBody>
       </p:sp>
     </p:spTree>
     <p:extLst>
       <p:ext uri="{BB962C8B-B14F-4D97-AF65-F5344CB8AC3E}">
-        <p14:creationId xmlns:p14="http://schemas.microsoft.com/office/powerpoint/2010/main" val="1396534205"/>
+        <p14:creationId xmlns:p14="http://schemas.microsoft.com/office/powerpoint/2010/main" val="356588586"/>
       </p:ext>
     </p:extLst>
   </p:cSld>
@@ -3735,7 +5299,15 @@
           <a:bodyPr/>
           <a:lstStyle/>
           <a:p>
-            <a:endParaRPr lang="en-US"/>
+            <a:r>
+              <a:rPr lang="en-US" dirty="0" smtClean="0"/>
+              <a:t>Ornstein-</a:t>
+            </a:r>
+            <a:r>
+              <a:rPr lang="en-US" dirty="0" err="1" smtClean="0"/>
+              <a:t>Uhlenbeck</a:t>
+            </a:r>
+            <a:endParaRPr lang="en-US" dirty="0"/>
           </a:p>
         </p:txBody>
       </p:sp>
@@ -3749,19 +5321,143 @@
             <p:ph idx="1"/>
           </p:nvPr>
         </p:nvSpPr>
-        <p:spPr/>
-        <p:txBody>
-          <a:bodyPr/>
-          <a:lstStyle/>
-          <a:p>
-            <a:endParaRPr lang="en-US"/>
+        <p:spPr>
+          <a:xfrm>
+            <a:off x="457200" y="1600200"/>
+            <a:ext cx="3263000" cy="4525963"/>
+          </a:xfrm>
+        </p:spPr>
+        <p:txBody>
+          <a:bodyPr>
+            <a:normAutofit fontScale="92500" lnSpcReduction="10000"/>
+          </a:bodyPr>
+          <a:lstStyle/>
+          <a:p>
+            <a:r>
+              <a:rPr lang="en-US" sz="3500" dirty="0" smtClean="0"/>
+              <a:t>“Rubber band” soft-bounds</a:t>
+            </a:r>
+          </a:p>
+          <a:p>
+            <a:r>
+              <a:rPr lang="el-GR" sz="3500" dirty="0" smtClean="0">
+                <a:solidFill>
+                  <a:srgbClr val="FF0000"/>
+                </a:solidFill>
+              </a:rPr>
+              <a:t>σ</a:t>
+            </a:r>
+            <a:r>
+              <a:rPr lang="el-GR" sz="3500" baseline="30000" dirty="0" smtClean="0">
+                <a:solidFill>
+                  <a:srgbClr val="FF0000"/>
+                </a:solidFill>
+              </a:rPr>
+              <a:t>2</a:t>
+            </a:r>
+            <a:r>
+              <a:rPr lang="en-US" sz="3500" dirty="0" smtClean="0">
+                <a:solidFill>
+                  <a:srgbClr val="FF0000"/>
+                </a:solidFill>
+              </a:rPr>
+              <a:t>: rate or </a:t>
+            </a:r>
+            <a:r>
+              <a:rPr lang="en-US" sz="3500" dirty="0" err="1" smtClean="0">
+                <a:solidFill>
+                  <a:srgbClr val="FF0000"/>
+                </a:solidFill>
+              </a:rPr>
+              <a:t>sd</a:t>
+            </a:r>
+            <a:endParaRPr lang="en-US" sz="3500" baseline="30000" dirty="0" smtClean="0">
+              <a:solidFill>
+                <a:srgbClr val="FF0000"/>
+              </a:solidFill>
+            </a:endParaRPr>
+          </a:p>
+          <a:p>
+            <a:r>
+              <a:rPr lang="el-GR" sz="3500" i="0" dirty="0" smtClean="0">
+                <a:ea typeface="Lucida Grande"/>
+                <a:cs typeface="Lucida Grande"/>
+              </a:rPr>
+              <a:t>μ</a:t>
+            </a:r>
+            <a:r>
+              <a:rPr lang="en-US" sz="3500" dirty="0" smtClean="0">
+                <a:ea typeface="Lucida Grande"/>
+                <a:cs typeface="Lucida Grande"/>
+              </a:rPr>
+              <a:t>: mean</a:t>
+            </a:r>
+            <a:endParaRPr lang="en-US" sz="3500" dirty="0" smtClean="0"/>
+          </a:p>
+          <a:p>
+            <a:r>
+              <a:rPr lang="el-GR" sz="3500" i="0" dirty="0" smtClean="0">
+                <a:ea typeface="Lucida Grande"/>
+                <a:cs typeface="Lucida Grande"/>
+              </a:rPr>
+              <a:t>θ</a:t>
+            </a:r>
+            <a:r>
+              <a:rPr lang="en-US" sz="3500" i="0" dirty="0" smtClean="0">
+                <a:ea typeface="Lucida Grande"/>
+                <a:cs typeface="Lucida Grande"/>
+              </a:rPr>
+              <a:t>: rate of mean-reversion</a:t>
+            </a:r>
+            <a:endParaRPr lang="en-US" sz="3500" dirty="0" smtClean="0"/>
+          </a:p>
+          <a:p>
+            <a:pPr lvl="1"/>
+            <a:r>
+              <a:rPr lang="el-GR" sz="1900" dirty="0" smtClean="0"/>
+              <a:t>θ</a:t>
+            </a:r>
+            <a:r>
+              <a:rPr lang="en-US" sz="1900" dirty="0" smtClean="0"/>
+              <a:t> = 0</a:t>
+            </a:r>
+          </a:p>
+          <a:p>
+            <a:pPr lvl="2"/>
+            <a:r>
+              <a:rPr lang="en-US" sz="1900" dirty="0" smtClean="0"/>
+              <a:t>BM</a:t>
+            </a:r>
+          </a:p>
+          <a:p>
+            <a:pPr lvl="1"/>
+            <a:r>
+              <a:rPr lang="el-GR" sz="1900" dirty="0" smtClean="0"/>
+              <a:t>θ</a:t>
+            </a:r>
+            <a:r>
+              <a:rPr lang="en-US" sz="1900" dirty="0" smtClean="0"/>
+              <a:t> = 1 </a:t>
+            </a:r>
+            <a:endParaRPr lang="en-US" sz="1900" dirty="0"/>
+          </a:p>
+          <a:p>
+            <a:pPr lvl="2"/>
+            <a:r>
+              <a:rPr lang="en-US" sz="1900" dirty="0" smtClean="0"/>
+              <a:t>Back to μ</a:t>
+            </a:r>
+          </a:p>
+          <a:p>
+            <a:pPr lvl="2"/>
+            <a:endParaRPr lang="en-US" dirty="0" smtClean="0"/>
           </a:p>
         </p:txBody>
       </p:sp>
     </p:spTree>
     <p:extLst>
       <p:ext uri="{BB962C8B-B14F-4D97-AF65-F5344CB8AC3E}">
-        <p14:creationId xmlns:p14="http://schemas.microsoft.com/office/powerpoint/2010/main" val="1588106317"/>
+        <p14:creationId xmlns:p14="http://schemas.microsoft.com/office/powerpoint/2010/main" val="2885123428"/>
       </p:ext>
     </p:extLst>
   </p:cSld>
@@ -3803,7 +5499,15 @@
           <a:bodyPr/>
           <a:lstStyle/>
           <a:p>
-            <a:endParaRPr lang="en-US"/>
+            <a:r>
+              <a:rPr lang="en-US" dirty="0" smtClean="0"/>
+              <a:t>Ornstein-</a:t>
+            </a:r>
+            <a:r>
+              <a:rPr lang="en-US" dirty="0" err="1" smtClean="0"/>
+              <a:t>Uhlenbeck</a:t>
+            </a:r>
+            <a:endParaRPr lang="en-US" dirty="0"/>
           </a:p>
         </p:txBody>
       </p:sp>
@@ -3817,19 +5521,323 @@
             <p:ph idx="1"/>
           </p:nvPr>
         </p:nvSpPr>
-        <p:spPr/>
-        <p:txBody>
-          <a:bodyPr/>
-          <a:lstStyle/>
-          <a:p>
-            <a:endParaRPr lang="en-US"/>
+        <p:spPr>
+          <a:xfrm>
+            <a:off x="457200" y="1600200"/>
+            <a:ext cx="3263000" cy="4525963"/>
+          </a:xfrm>
+        </p:spPr>
+        <p:txBody>
+          <a:bodyPr>
+            <a:normAutofit fontScale="92500" lnSpcReduction="10000"/>
+          </a:bodyPr>
+          <a:lstStyle/>
+          <a:p>
+            <a:r>
+              <a:rPr lang="en-US" sz="3500" dirty="0" smtClean="0"/>
+              <a:t>“Rubber band” soft-bounds</a:t>
+            </a:r>
+          </a:p>
+          <a:p>
+            <a:r>
+              <a:rPr lang="el-GR" sz="3500" dirty="0" smtClean="0"/>
+              <a:t>σ</a:t>
+            </a:r>
+            <a:r>
+              <a:rPr lang="el-GR" sz="3500" baseline="30000" dirty="0" smtClean="0"/>
+              <a:t>2</a:t>
+            </a:r>
+            <a:r>
+              <a:rPr lang="en-US" sz="3500" dirty="0" smtClean="0"/>
+              <a:t>: rate or </a:t>
+            </a:r>
+            <a:r>
+              <a:rPr lang="en-US" sz="3500" dirty="0" err="1" smtClean="0"/>
+              <a:t>sd</a:t>
+            </a:r>
+            <a:endParaRPr lang="en-US" sz="3500" baseline="30000" dirty="0" smtClean="0"/>
+          </a:p>
+          <a:p>
+            <a:r>
+              <a:rPr lang="el-GR" sz="3500" i="0" dirty="0" smtClean="0">
+                <a:solidFill>
+                  <a:srgbClr val="FF0000"/>
+                </a:solidFill>
+                <a:ea typeface="Lucida Grande"/>
+                <a:cs typeface="Lucida Grande"/>
+              </a:rPr>
+              <a:t>μ</a:t>
+            </a:r>
+            <a:r>
+              <a:rPr lang="en-US" sz="3500" dirty="0" smtClean="0">
+                <a:solidFill>
+                  <a:srgbClr val="FF0000"/>
+                </a:solidFill>
+                <a:ea typeface="Lucida Grande"/>
+                <a:cs typeface="Lucida Grande"/>
+              </a:rPr>
+              <a:t>: mean</a:t>
+            </a:r>
+            <a:endParaRPr lang="en-US" sz="3500" dirty="0" smtClean="0">
+              <a:solidFill>
+                <a:srgbClr val="FF0000"/>
+              </a:solidFill>
+            </a:endParaRPr>
+          </a:p>
+          <a:p>
+            <a:r>
+              <a:rPr lang="el-GR" sz="3500" i="0" dirty="0" smtClean="0">
+                <a:ea typeface="Lucida Grande"/>
+                <a:cs typeface="Lucida Grande"/>
+              </a:rPr>
+              <a:t>θ</a:t>
+            </a:r>
+            <a:r>
+              <a:rPr lang="en-US" sz="3500" i="0" dirty="0" smtClean="0">
+                <a:ea typeface="Lucida Grande"/>
+                <a:cs typeface="Lucida Grande"/>
+              </a:rPr>
+              <a:t>: rate of mean-reversion</a:t>
+            </a:r>
+            <a:endParaRPr lang="en-US" sz="3500" dirty="0" smtClean="0"/>
+          </a:p>
+          <a:p>
+            <a:pPr lvl="1"/>
+            <a:r>
+              <a:rPr lang="el-GR" sz="1900" dirty="0" smtClean="0"/>
+              <a:t>θ</a:t>
+            </a:r>
+            <a:r>
+              <a:rPr lang="en-US" sz="1900" dirty="0" smtClean="0"/>
+              <a:t> = 0</a:t>
+            </a:r>
+          </a:p>
+          <a:p>
+            <a:pPr lvl="2"/>
+            <a:r>
+              <a:rPr lang="en-US" sz="1900" dirty="0" smtClean="0"/>
+              <a:t>BM</a:t>
+            </a:r>
+          </a:p>
+          <a:p>
+            <a:pPr lvl="1"/>
+            <a:r>
+              <a:rPr lang="el-GR" sz="1900" dirty="0" smtClean="0"/>
+              <a:t>θ</a:t>
+            </a:r>
+            <a:r>
+              <a:rPr lang="en-US" sz="1900" dirty="0" smtClean="0"/>
+              <a:t> = 1 </a:t>
+            </a:r>
+            <a:endParaRPr lang="en-US" sz="1900" dirty="0"/>
+          </a:p>
+          <a:p>
+            <a:pPr lvl="2"/>
+            <a:r>
+              <a:rPr lang="en-US" sz="1900" dirty="0" smtClean="0"/>
+              <a:t>Back to μ</a:t>
+            </a:r>
+          </a:p>
+          <a:p>
+            <a:pPr lvl="2"/>
+            <a:endParaRPr lang="en-US" dirty="0" smtClean="0"/>
           </a:p>
         </p:txBody>
       </p:sp>
     </p:spTree>
     <p:extLst>
       <p:ext uri="{BB962C8B-B14F-4D97-AF65-F5344CB8AC3E}">
-        <p14:creationId xmlns:p14="http://schemas.microsoft.com/office/powerpoint/2010/main" val="1980410066"/>
+        <p14:creationId xmlns:p14="http://schemas.microsoft.com/office/powerpoint/2010/main" val="2885123428"/>
+      </p:ext>
+    </p:extLst>
+  </p:cSld>
+  <p:clrMapOvr>
+    <a:masterClrMapping/>
+  </p:clrMapOvr>
+</p:sld>
+</file>
+
+<file path=ppt/slides/slide9.xml><?xml version="1.0" encoding="utf-8"?>
+<p:sld xmlns:a="http://schemas.openxmlformats.org/drawingml/2006/main" xmlns:r="http://schemas.openxmlformats.org/officeDocument/2006/relationships" xmlns:p="http://schemas.openxmlformats.org/presentationml/2006/main">
+  <p:cSld>
+    <p:spTree>
+      <p:nvGrpSpPr>
+        <p:cNvPr id="1" name=""/>
+        <p:cNvGrpSpPr/>
+        <p:nvPr/>
+      </p:nvGrpSpPr>
+      <p:grpSpPr>
+        <a:xfrm>
+          <a:off x="0" y="0"/>
+          <a:ext cx="0" cy="0"/>
+          <a:chOff x="0" y="0"/>
+          <a:chExt cx="0" cy="0"/>
+        </a:xfrm>
+      </p:grpSpPr>
+      <p:sp>
+        <p:nvSpPr>
+          <p:cNvPr id="2" name="Title 1"/>
+          <p:cNvSpPr>
+            <a:spLocks noGrp="1"/>
+          </p:cNvSpPr>
+          <p:nvPr>
+            <p:ph type="title"/>
+          </p:nvPr>
+        </p:nvSpPr>
+        <p:spPr/>
+        <p:txBody>
+          <a:bodyPr/>
+          <a:lstStyle/>
+          <a:p>
+            <a:r>
+              <a:rPr lang="en-US" dirty="0" smtClean="0"/>
+              <a:t>Ornstein-</a:t>
+            </a:r>
+            <a:r>
+              <a:rPr lang="en-US" dirty="0" err="1" smtClean="0"/>
+              <a:t>Uhlenbeck</a:t>
+            </a:r>
+            <a:endParaRPr lang="en-US" dirty="0"/>
+          </a:p>
+        </p:txBody>
+      </p:sp>
+      <p:sp>
+        <p:nvSpPr>
+          <p:cNvPr id="3" name="Content Placeholder 2"/>
+          <p:cNvSpPr>
+            <a:spLocks noGrp="1"/>
+          </p:cNvSpPr>
+          <p:nvPr>
+            <p:ph idx="1"/>
+          </p:nvPr>
+        </p:nvSpPr>
+        <p:spPr>
+          <a:xfrm>
+            <a:off x="457200" y="1600200"/>
+            <a:ext cx="3263000" cy="4525963"/>
+          </a:xfrm>
+        </p:spPr>
+        <p:txBody>
+          <a:bodyPr>
+            <a:normAutofit fontScale="92500" lnSpcReduction="10000"/>
+          </a:bodyPr>
+          <a:lstStyle/>
+          <a:p>
+            <a:r>
+              <a:rPr lang="en-US" sz="3500" dirty="0" smtClean="0"/>
+              <a:t>“Rubber band” soft-bounds</a:t>
+            </a:r>
+          </a:p>
+          <a:p>
+            <a:r>
+              <a:rPr lang="el-GR" sz="3500" dirty="0" smtClean="0"/>
+              <a:t>σ</a:t>
+            </a:r>
+            <a:r>
+              <a:rPr lang="el-GR" sz="3500" baseline="30000" dirty="0" smtClean="0"/>
+              <a:t>2</a:t>
+            </a:r>
+            <a:r>
+              <a:rPr lang="en-US" sz="3500" dirty="0" smtClean="0"/>
+              <a:t>: rate or </a:t>
+            </a:r>
+            <a:r>
+              <a:rPr lang="en-US" sz="3500" dirty="0" err="1" smtClean="0"/>
+              <a:t>sd</a:t>
+            </a:r>
+            <a:endParaRPr lang="en-US" sz="3500" baseline="30000" dirty="0" smtClean="0"/>
+          </a:p>
+          <a:p>
+            <a:r>
+              <a:rPr lang="el-GR" sz="3500" i="0" dirty="0" smtClean="0">
+                <a:ea typeface="Lucida Grande"/>
+                <a:cs typeface="Lucida Grande"/>
+              </a:rPr>
+              <a:t>μ</a:t>
+            </a:r>
+            <a:r>
+              <a:rPr lang="en-US" sz="3500" dirty="0" smtClean="0">
+                <a:ea typeface="Lucida Grande"/>
+                <a:cs typeface="Lucida Grande"/>
+              </a:rPr>
+              <a:t>: mean</a:t>
+            </a:r>
+            <a:endParaRPr lang="en-US" sz="3500" dirty="0" smtClean="0"/>
+          </a:p>
+          <a:p>
+            <a:r>
+              <a:rPr lang="el-GR" sz="3500" i="0" dirty="0" smtClean="0">
+                <a:solidFill>
+                  <a:srgbClr val="FF0000"/>
+                </a:solidFill>
+                <a:ea typeface="Lucida Grande"/>
+                <a:cs typeface="Lucida Grande"/>
+              </a:rPr>
+              <a:t>θ</a:t>
+            </a:r>
+            <a:r>
+              <a:rPr lang="en-US" sz="3500" i="0" dirty="0" smtClean="0">
+                <a:solidFill>
+                  <a:srgbClr val="FF0000"/>
+                </a:solidFill>
+                <a:ea typeface="Lucida Grande"/>
+                <a:cs typeface="Lucida Grande"/>
+              </a:rPr>
+              <a:t>: rate of mean-reversion</a:t>
+            </a:r>
+            <a:endParaRPr lang="en-US" sz="3500" dirty="0" smtClean="0">
+              <a:solidFill>
+                <a:srgbClr val="FF0000"/>
+              </a:solidFill>
+            </a:endParaRPr>
+          </a:p>
+          <a:p>
+            <a:pPr lvl="1"/>
+            <a:r>
+              <a:rPr lang="el-GR" sz="1900" dirty="0" smtClean="0"/>
+              <a:t>θ</a:t>
+            </a:r>
+            <a:r>
+              <a:rPr lang="en-US" sz="1900" dirty="0" smtClean="0"/>
+              <a:t> = 0</a:t>
+            </a:r>
+          </a:p>
+          <a:p>
+            <a:pPr lvl="2"/>
+            <a:r>
+              <a:rPr lang="en-US" sz="1900" dirty="0" smtClean="0"/>
+              <a:t>BM</a:t>
+            </a:r>
+          </a:p>
+          <a:p>
+            <a:pPr lvl="1"/>
+            <a:r>
+              <a:rPr lang="el-GR" sz="1900" dirty="0" smtClean="0"/>
+              <a:t>θ</a:t>
+            </a:r>
+            <a:r>
+              <a:rPr lang="en-US" sz="1900" dirty="0" smtClean="0"/>
+              <a:t> = 1 </a:t>
+            </a:r>
+            <a:endParaRPr lang="en-US" sz="1900" dirty="0"/>
+          </a:p>
+          <a:p>
+            <a:pPr lvl="2"/>
+            <a:r>
+              <a:rPr lang="en-US" sz="1900" dirty="0" smtClean="0"/>
+              <a:t>Back to μ</a:t>
+            </a:r>
+          </a:p>
+          <a:p>
+            <a:pPr lvl="2"/>
+            <a:endParaRPr lang="en-US" dirty="0" smtClean="0"/>
+          </a:p>
+        </p:txBody>
+      </p:sp>
+    </p:spTree>
+    <p:extLst>
+      <p:ext uri="{BB962C8B-B14F-4D97-AF65-F5344CB8AC3E}">
+        <p14:creationId xmlns:p14="http://schemas.microsoft.com/office/powerpoint/2010/main" val="2885123428"/>
       </p:ext>
     </p:extLst>
   </p:cSld>

</xml_diff>